<commit_message>
making changes to presentation
</commit_message>
<xml_diff>
--- a/docs/LingoLizard.pptx
+++ b/docs/LingoLizard.pptx
@@ -5,44 +5,39 @@
     <p:sldMasterId id="2147483659" r:id="rId1"/>
   </p:sldMasterIdLst>
   <p:notesMasterIdLst>
-    <p:notesMasterId r:id="rId15"/>
+    <p:notesMasterId r:id="rId10"/>
   </p:notesMasterIdLst>
   <p:sldIdLst>
     <p:sldId id="256" r:id="rId2"/>
     <p:sldId id="257" r:id="rId3"/>
-    <p:sldId id="258" r:id="rId4"/>
-    <p:sldId id="259" r:id="rId5"/>
-    <p:sldId id="260" r:id="rId6"/>
-    <p:sldId id="261" r:id="rId7"/>
-    <p:sldId id="262" r:id="rId8"/>
-    <p:sldId id="263" r:id="rId9"/>
-    <p:sldId id="264" r:id="rId10"/>
-    <p:sldId id="265" r:id="rId11"/>
-    <p:sldId id="266" r:id="rId12"/>
-    <p:sldId id="267" r:id="rId13"/>
-    <p:sldId id="268" r:id="rId14"/>
+    <p:sldId id="261" r:id="rId4"/>
+    <p:sldId id="262" r:id="rId5"/>
+    <p:sldId id="265" r:id="rId6"/>
+    <p:sldId id="269" r:id="rId7"/>
+    <p:sldId id="266" r:id="rId8"/>
+    <p:sldId id="268" r:id="rId9"/>
   </p:sldIdLst>
   <p:sldSz cx="9144000" cy="5143500" type="screen16x9"/>
   <p:notesSz cx="6858000" cy="9144000"/>
   <p:embeddedFontLst>
     <p:embeddedFont>
       <p:font typeface="Lato" panose="020F0502020204030203" pitchFamily="34" charset="0"/>
-      <p:regular r:id="rId16"/>
-      <p:bold r:id="rId17"/>
-      <p:italic r:id="rId18"/>
-      <p:boldItalic r:id="rId19"/>
+      <p:regular r:id="rId11"/>
+      <p:bold r:id="rId12"/>
+      <p:italic r:id="rId13"/>
+      <p:boldItalic r:id="rId14"/>
     </p:embeddedFont>
     <p:embeddedFont>
       <p:font typeface="Oswald" panose="00000500000000000000" pitchFamily="2" charset="0"/>
-      <p:regular r:id="rId20"/>
-      <p:bold r:id="rId21"/>
+      <p:regular r:id="rId15"/>
+      <p:bold r:id="rId16"/>
     </p:embeddedFont>
     <p:embeddedFont>
       <p:font typeface="Raleway" pitchFamily="2" charset="0"/>
-      <p:regular r:id="rId22"/>
-      <p:bold r:id="rId23"/>
-      <p:italic r:id="rId24"/>
-      <p:boldItalic r:id="rId25"/>
+      <p:regular r:id="rId17"/>
+      <p:bold r:id="rId18"/>
+      <p:italic r:id="rId19"/>
+      <p:boldItalic r:id="rId20"/>
     </p:embeddedFont>
   </p:embeddedFontLst>
   <p:defaultTextStyle>
@@ -763,8 +758,8 @@
         </p:nvSpPr>
         <p:spPr>
           <a:xfrm>
-            <a:off x="381300" y="685800"/>
-            <a:ext cx="6096075" cy="3429000"/>
+            <a:off x="381000" y="685800"/>
+            <a:ext cx="6096000" cy="3429000"/>
           </a:xfrm>
           <a:custGeom>
             <a:avLst/>
@@ -838,7 +833,319 @@
 </p:notes>
 </file>
 
-<file path=ppt/notesSlides/notesSlide10.xml><?xml version="1.0" encoding="utf-8"?>
+<file path=ppt/notesSlides/notesSlide2.xml><?xml version="1.0" encoding="utf-8"?>
+<p:notes xmlns:a="http://schemas.openxmlformats.org/drawingml/2006/main" xmlns:r="http://schemas.openxmlformats.org/officeDocument/2006/relationships" xmlns:p="http://schemas.openxmlformats.org/presentationml/2006/main" showMasterSp="0" showMasterPhAnim="0">
+  <p:cSld>
+    <p:spTree>
+      <p:nvGrpSpPr>
+        <p:cNvPr id="1" name="Shape 74"/>
+        <p:cNvGrpSpPr/>
+        <p:nvPr/>
+      </p:nvGrpSpPr>
+      <p:grpSpPr>
+        <a:xfrm>
+          <a:off x="0" y="0"/>
+          <a:ext cx="0" cy="0"/>
+          <a:chOff x="0" y="0"/>
+          <a:chExt cx="0" cy="0"/>
+        </a:xfrm>
+      </p:grpSpPr>
+      <p:sp>
+        <p:nvSpPr>
+          <p:cNvPr id="75" name="Google Shape;75;g30e3b1f18c4_0_78:notes"/>
+          <p:cNvSpPr>
+            <a:spLocks noGrp="1" noRot="1" noChangeAspect="1"/>
+          </p:cNvSpPr>
+          <p:nvPr>
+            <p:ph type="sldImg" idx="2"/>
+          </p:nvPr>
+        </p:nvSpPr>
+        <p:spPr>
+          <a:xfrm>
+            <a:off x="381000" y="685800"/>
+            <a:ext cx="6096000" cy="3429000"/>
+          </a:xfrm>
+          <a:custGeom>
+            <a:avLst/>
+            <a:gdLst/>
+            <a:ahLst/>
+            <a:cxnLst/>
+            <a:rect l="l" t="t" r="r" b="b"/>
+            <a:pathLst>
+              <a:path w="120000" h="120000" extrusionOk="0">
+                <a:moveTo>
+                  <a:pt x="0" y="0"/>
+                </a:moveTo>
+                <a:lnTo>
+                  <a:pt x="120000" y="0"/>
+                </a:lnTo>
+                <a:lnTo>
+                  <a:pt x="120000" y="120000"/>
+                </a:lnTo>
+                <a:lnTo>
+                  <a:pt x="0" y="120000"/>
+                </a:lnTo>
+                <a:close/>
+              </a:path>
+            </a:pathLst>
+          </a:custGeom>
+        </p:spPr>
+      </p:sp>
+      <p:sp>
+        <p:nvSpPr>
+          <p:cNvPr id="76" name="Google Shape;76;g30e3b1f18c4_0_78:notes"/>
+          <p:cNvSpPr txBox="1">
+            <a:spLocks noGrp="1"/>
+          </p:cNvSpPr>
+          <p:nvPr>
+            <p:ph type="body" idx="1"/>
+          </p:nvPr>
+        </p:nvSpPr>
+        <p:spPr>
+          <a:xfrm>
+            <a:off x="685800" y="4343400"/>
+            <a:ext cx="5486400" cy="4114800"/>
+          </a:xfrm>
+          <a:prstGeom prst="rect">
+            <a:avLst/>
+          </a:prstGeom>
+        </p:spPr>
+        <p:txBody>
+          <a:bodyPr spcFirstLastPara="1" wrap="square" lIns="91425" tIns="91425" rIns="91425" bIns="91425" anchor="t" anchorCtr="0">
+            <a:noAutofit/>
+          </a:bodyPr>
+          <a:lstStyle/>
+          <a:p>
+            <a:pPr marL="0" lvl="0" indent="0" algn="l" rtl="0">
+              <a:spcBef>
+                <a:spcPts val="0"/>
+              </a:spcBef>
+              <a:spcAft>
+                <a:spcPts val="0"/>
+              </a:spcAft>
+              <a:buNone/>
+            </a:pPr>
+            <a:endParaRPr/>
+          </a:p>
+        </p:txBody>
+      </p:sp>
+    </p:spTree>
+  </p:cSld>
+  <p:clrMapOvr>
+    <a:masterClrMapping/>
+  </p:clrMapOvr>
+</p:notes>
+</file>
+
+<file path=ppt/notesSlides/notesSlide3.xml><?xml version="1.0" encoding="utf-8"?>
+<p:notes xmlns:a="http://schemas.openxmlformats.org/drawingml/2006/main" xmlns:r="http://schemas.openxmlformats.org/officeDocument/2006/relationships" xmlns:p="http://schemas.openxmlformats.org/presentationml/2006/main" showMasterSp="0" showMasterPhAnim="0">
+  <p:cSld>
+    <p:spTree>
+      <p:nvGrpSpPr>
+        <p:cNvPr id="1" name="Shape 101"/>
+        <p:cNvGrpSpPr/>
+        <p:nvPr/>
+      </p:nvGrpSpPr>
+      <p:grpSpPr>
+        <a:xfrm>
+          <a:off x="0" y="0"/>
+          <a:ext cx="0" cy="0"/>
+          <a:chOff x="0" y="0"/>
+          <a:chExt cx="0" cy="0"/>
+        </a:xfrm>
+      </p:grpSpPr>
+      <p:sp>
+        <p:nvSpPr>
+          <p:cNvPr id="102" name="Google Shape;102;g31395230ebd_0_20:notes"/>
+          <p:cNvSpPr>
+            <a:spLocks noGrp="1" noRot="1" noChangeAspect="1"/>
+          </p:cNvSpPr>
+          <p:nvPr>
+            <p:ph type="sldImg" idx="2"/>
+          </p:nvPr>
+        </p:nvSpPr>
+        <p:spPr>
+          <a:xfrm>
+            <a:off x="381000" y="685800"/>
+            <a:ext cx="6096000" cy="3429000"/>
+          </a:xfrm>
+          <a:custGeom>
+            <a:avLst/>
+            <a:gdLst/>
+            <a:ahLst/>
+            <a:cxnLst/>
+            <a:rect l="l" t="t" r="r" b="b"/>
+            <a:pathLst>
+              <a:path w="120000" h="120000" extrusionOk="0">
+                <a:moveTo>
+                  <a:pt x="0" y="0"/>
+                </a:moveTo>
+                <a:lnTo>
+                  <a:pt x="120000" y="0"/>
+                </a:lnTo>
+                <a:lnTo>
+                  <a:pt x="120000" y="120000"/>
+                </a:lnTo>
+                <a:lnTo>
+                  <a:pt x="0" y="120000"/>
+                </a:lnTo>
+                <a:close/>
+              </a:path>
+            </a:pathLst>
+          </a:custGeom>
+        </p:spPr>
+      </p:sp>
+      <p:sp>
+        <p:nvSpPr>
+          <p:cNvPr id="103" name="Google Shape;103;g31395230ebd_0_20:notes"/>
+          <p:cNvSpPr txBox="1">
+            <a:spLocks noGrp="1"/>
+          </p:cNvSpPr>
+          <p:nvPr>
+            <p:ph type="body" idx="1"/>
+          </p:nvPr>
+        </p:nvSpPr>
+        <p:spPr>
+          <a:xfrm>
+            <a:off x="685800" y="4343400"/>
+            <a:ext cx="5486400" cy="4114800"/>
+          </a:xfrm>
+          <a:prstGeom prst="rect">
+            <a:avLst/>
+          </a:prstGeom>
+        </p:spPr>
+        <p:txBody>
+          <a:bodyPr spcFirstLastPara="1" wrap="square" lIns="91425" tIns="91425" rIns="91425" bIns="91425" anchor="t" anchorCtr="0">
+            <a:noAutofit/>
+          </a:bodyPr>
+          <a:lstStyle/>
+          <a:p>
+            <a:pPr marL="0" lvl="0" indent="0" algn="l" rtl="0">
+              <a:spcBef>
+                <a:spcPts val="0"/>
+              </a:spcBef>
+              <a:spcAft>
+                <a:spcPts val="0"/>
+              </a:spcAft>
+              <a:buNone/>
+            </a:pPr>
+            <a:endParaRPr/>
+          </a:p>
+        </p:txBody>
+      </p:sp>
+    </p:spTree>
+  </p:cSld>
+  <p:clrMapOvr>
+    <a:masterClrMapping/>
+  </p:clrMapOvr>
+</p:notes>
+</file>
+
+<file path=ppt/notesSlides/notesSlide4.xml><?xml version="1.0" encoding="utf-8"?>
+<p:notes xmlns:a="http://schemas.openxmlformats.org/drawingml/2006/main" xmlns:r="http://schemas.openxmlformats.org/officeDocument/2006/relationships" xmlns:p="http://schemas.openxmlformats.org/presentationml/2006/main" showMasterSp="0" showMasterPhAnim="0">
+  <p:cSld>
+    <p:spTree>
+      <p:nvGrpSpPr>
+        <p:cNvPr id="1" name="Shape 109"/>
+        <p:cNvGrpSpPr/>
+        <p:nvPr/>
+      </p:nvGrpSpPr>
+      <p:grpSpPr>
+        <a:xfrm>
+          <a:off x="0" y="0"/>
+          <a:ext cx="0" cy="0"/>
+          <a:chOff x="0" y="0"/>
+          <a:chExt cx="0" cy="0"/>
+        </a:xfrm>
+      </p:grpSpPr>
+      <p:sp>
+        <p:nvSpPr>
+          <p:cNvPr id="110" name="Google Shape;110;g30e3b1f18c4_0_100:notes"/>
+          <p:cNvSpPr>
+            <a:spLocks noGrp="1" noRot="1" noChangeAspect="1"/>
+          </p:cNvSpPr>
+          <p:nvPr>
+            <p:ph type="sldImg" idx="2"/>
+          </p:nvPr>
+        </p:nvSpPr>
+        <p:spPr>
+          <a:xfrm>
+            <a:off x="381000" y="685800"/>
+            <a:ext cx="6096000" cy="3429000"/>
+          </a:xfrm>
+          <a:custGeom>
+            <a:avLst/>
+            <a:gdLst/>
+            <a:ahLst/>
+            <a:cxnLst/>
+            <a:rect l="l" t="t" r="r" b="b"/>
+            <a:pathLst>
+              <a:path w="120000" h="120000" extrusionOk="0">
+                <a:moveTo>
+                  <a:pt x="0" y="0"/>
+                </a:moveTo>
+                <a:lnTo>
+                  <a:pt x="120000" y="0"/>
+                </a:lnTo>
+                <a:lnTo>
+                  <a:pt x="120000" y="120000"/>
+                </a:lnTo>
+                <a:lnTo>
+                  <a:pt x="0" y="120000"/>
+                </a:lnTo>
+                <a:close/>
+              </a:path>
+            </a:pathLst>
+          </a:custGeom>
+        </p:spPr>
+      </p:sp>
+      <p:sp>
+        <p:nvSpPr>
+          <p:cNvPr id="111" name="Google Shape;111;g30e3b1f18c4_0_100:notes"/>
+          <p:cNvSpPr txBox="1">
+            <a:spLocks noGrp="1"/>
+          </p:cNvSpPr>
+          <p:nvPr>
+            <p:ph type="body" idx="1"/>
+          </p:nvPr>
+        </p:nvSpPr>
+        <p:spPr>
+          <a:xfrm>
+            <a:off x="685800" y="4343400"/>
+            <a:ext cx="5486400" cy="4114800"/>
+          </a:xfrm>
+          <a:prstGeom prst="rect">
+            <a:avLst/>
+          </a:prstGeom>
+        </p:spPr>
+        <p:txBody>
+          <a:bodyPr spcFirstLastPara="1" wrap="square" lIns="91425" tIns="91425" rIns="91425" bIns="91425" anchor="t" anchorCtr="0">
+            <a:noAutofit/>
+          </a:bodyPr>
+          <a:lstStyle/>
+          <a:p>
+            <a:pPr marL="0" lvl="0" indent="0" algn="l" rtl="0">
+              <a:spcBef>
+                <a:spcPts val="0"/>
+              </a:spcBef>
+              <a:spcAft>
+                <a:spcPts val="0"/>
+              </a:spcAft>
+              <a:buNone/>
+            </a:pPr>
+            <a:endParaRPr/>
+          </a:p>
+        </p:txBody>
+      </p:sp>
+    </p:spTree>
+  </p:cSld>
+  <p:clrMapOvr>
+    <a:masterClrMapping/>
+  </p:clrMapOvr>
+</p:notes>
+</file>
+
+<file path=ppt/notesSlides/notesSlide5.xml><?xml version="1.0" encoding="utf-8"?>
 <p:notes xmlns:a="http://schemas.openxmlformats.org/drawingml/2006/main" xmlns:r="http://schemas.openxmlformats.org/officeDocument/2006/relationships" xmlns:p="http://schemas.openxmlformats.org/presentationml/2006/main" showMasterSp="0" showMasterPhAnim="0">
   <p:cSld>
     <p:spTree>
@@ -942,7 +1249,7 @@
 </p:notes>
 </file>
 
-<file path=ppt/notesSlides/notesSlide11.xml><?xml version="1.0" encoding="utf-8"?>
+<file path=ppt/notesSlides/notesSlide6.xml><?xml version="1.0" encoding="utf-8"?>
 <p:notes xmlns:a="http://schemas.openxmlformats.org/drawingml/2006/main" xmlns:r="http://schemas.openxmlformats.org/officeDocument/2006/relationships" xmlns:p="http://schemas.openxmlformats.org/presentationml/2006/main" showMasterSp="0" showMasterPhAnim="0">
   <p:cSld>
     <p:spTree>
@@ -971,7 +1278,7 @@
         </p:nvSpPr>
         <p:spPr>
           <a:xfrm>
-            <a:off x="381300" y="685800"/>
+            <a:off x="381000" y="685800"/>
             <a:ext cx="6096000" cy="3429000"/>
           </a:xfrm>
           <a:custGeom>
@@ -1046,111 +1353,7 @@
 </p:notes>
 </file>
 
-<file path=ppt/notesSlides/notesSlide12.xml><?xml version="1.0" encoding="utf-8"?>
-<p:notes xmlns:a="http://schemas.openxmlformats.org/drawingml/2006/main" xmlns:r="http://schemas.openxmlformats.org/officeDocument/2006/relationships" xmlns:p="http://schemas.openxmlformats.org/presentationml/2006/main" showMasterSp="0" showMasterPhAnim="0">
-  <p:cSld>
-    <p:spTree>
-      <p:nvGrpSpPr>
-        <p:cNvPr id="1" name="Shape 140"/>
-        <p:cNvGrpSpPr/>
-        <p:nvPr/>
-      </p:nvGrpSpPr>
-      <p:grpSpPr>
-        <a:xfrm>
-          <a:off x="0" y="0"/>
-          <a:ext cx="0" cy="0"/>
-          <a:chOff x="0" y="0"/>
-          <a:chExt cx="0" cy="0"/>
-        </a:xfrm>
-      </p:grpSpPr>
-      <p:sp>
-        <p:nvSpPr>
-          <p:cNvPr id="141" name="Google Shape;141;g30e3b1f18c4_0_139:notes"/>
-          <p:cNvSpPr>
-            <a:spLocks noGrp="1" noRot="1" noChangeAspect="1"/>
-          </p:cNvSpPr>
-          <p:nvPr>
-            <p:ph type="sldImg" idx="2"/>
-          </p:nvPr>
-        </p:nvSpPr>
-        <p:spPr>
-          <a:xfrm>
-            <a:off x="381300" y="685800"/>
-            <a:ext cx="6096000" cy="3429000"/>
-          </a:xfrm>
-          <a:custGeom>
-            <a:avLst/>
-            <a:gdLst/>
-            <a:ahLst/>
-            <a:cxnLst/>
-            <a:rect l="l" t="t" r="r" b="b"/>
-            <a:pathLst>
-              <a:path w="120000" h="120000" extrusionOk="0">
-                <a:moveTo>
-                  <a:pt x="0" y="0"/>
-                </a:moveTo>
-                <a:lnTo>
-                  <a:pt x="120000" y="0"/>
-                </a:lnTo>
-                <a:lnTo>
-                  <a:pt x="120000" y="120000"/>
-                </a:lnTo>
-                <a:lnTo>
-                  <a:pt x="0" y="120000"/>
-                </a:lnTo>
-                <a:close/>
-              </a:path>
-            </a:pathLst>
-          </a:custGeom>
-        </p:spPr>
-      </p:sp>
-      <p:sp>
-        <p:nvSpPr>
-          <p:cNvPr id="142" name="Google Shape;142;g30e3b1f18c4_0_139:notes"/>
-          <p:cNvSpPr txBox="1">
-            <a:spLocks noGrp="1"/>
-          </p:cNvSpPr>
-          <p:nvPr>
-            <p:ph type="body" idx="1"/>
-          </p:nvPr>
-        </p:nvSpPr>
-        <p:spPr>
-          <a:xfrm>
-            <a:off x="685800" y="4343400"/>
-            <a:ext cx="5486400" cy="4114800"/>
-          </a:xfrm>
-          <a:prstGeom prst="rect">
-            <a:avLst/>
-          </a:prstGeom>
-        </p:spPr>
-        <p:txBody>
-          <a:bodyPr spcFirstLastPara="1" wrap="square" lIns="91425" tIns="91425" rIns="91425" bIns="91425" anchor="t" anchorCtr="0">
-            <a:noAutofit/>
-          </a:bodyPr>
-          <a:lstStyle/>
-          <a:p>
-            <a:pPr marL="0" lvl="0" indent="0" algn="l" rtl="0">
-              <a:spcBef>
-                <a:spcPts val="0"/>
-              </a:spcBef>
-              <a:spcAft>
-                <a:spcPts val="0"/>
-              </a:spcAft>
-              <a:buNone/>
-            </a:pPr>
-            <a:endParaRPr/>
-          </a:p>
-        </p:txBody>
-      </p:sp>
-    </p:spTree>
-  </p:cSld>
-  <p:clrMapOvr>
-    <a:masterClrMapping/>
-  </p:clrMapOvr>
-</p:notes>
-</file>
-
-<file path=ppt/notesSlides/notesSlide13.xml><?xml version="1.0" encoding="utf-8"?>
+<file path=ppt/notesSlides/notesSlide7.xml><?xml version="1.0" encoding="utf-8"?>
 <p:notes xmlns:a="http://schemas.openxmlformats.org/drawingml/2006/main" xmlns:r="http://schemas.openxmlformats.org/officeDocument/2006/relationships" xmlns:p="http://schemas.openxmlformats.org/presentationml/2006/main" showMasterSp="0" showMasterPhAnim="0">
   <p:cSld>
     <p:spTree>
@@ -1179,7 +1382,7 @@
         </p:nvSpPr>
         <p:spPr>
           <a:xfrm>
-            <a:off x="381300" y="685800"/>
+            <a:off x="381000" y="685800"/>
             <a:ext cx="6096000" cy="3429000"/>
           </a:xfrm>
           <a:custGeom>
@@ -1254,849 +1457,9 @@
 </p:notes>
 </file>
 
-<file path=ppt/notesSlides/notesSlide2.xml><?xml version="1.0" encoding="utf-8"?>
-<p:notes xmlns:a="http://schemas.openxmlformats.org/drawingml/2006/main" xmlns:r="http://schemas.openxmlformats.org/officeDocument/2006/relationships" xmlns:p="http://schemas.openxmlformats.org/presentationml/2006/main" showMasterSp="0" showMasterPhAnim="0">
-  <p:cSld>
-    <p:spTree>
-      <p:nvGrpSpPr>
-        <p:cNvPr id="1" name="Shape 74"/>
-        <p:cNvGrpSpPr/>
-        <p:nvPr/>
-      </p:nvGrpSpPr>
-      <p:grpSpPr>
-        <a:xfrm>
-          <a:off x="0" y="0"/>
-          <a:ext cx="0" cy="0"/>
-          <a:chOff x="0" y="0"/>
-          <a:chExt cx="0" cy="0"/>
-        </a:xfrm>
-      </p:grpSpPr>
-      <p:sp>
-        <p:nvSpPr>
-          <p:cNvPr id="75" name="Google Shape;75;g30e3b1f18c4_0_78:notes"/>
-          <p:cNvSpPr>
-            <a:spLocks noGrp="1" noRot="1" noChangeAspect="1"/>
-          </p:cNvSpPr>
-          <p:nvPr>
-            <p:ph type="sldImg" idx="2"/>
-          </p:nvPr>
-        </p:nvSpPr>
-        <p:spPr>
-          <a:xfrm>
-            <a:off x="381300" y="685800"/>
-            <a:ext cx="6096000" cy="3429000"/>
-          </a:xfrm>
-          <a:custGeom>
-            <a:avLst/>
-            <a:gdLst/>
-            <a:ahLst/>
-            <a:cxnLst/>
-            <a:rect l="l" t="t" r="r" b="b"/>
-            <a:pathLst>
-              <a:path w="120000" h="120000" extrusionOk="0">
-                <a:moveTo>
-                  <a:pt x="0" y="0"/>
-                </a:moveTo>
-                <a:lnTo>
-                  <a:pt x="120000" y="0"/>
-                </a:lnTo>
-                <a:lnTo>
-                  <a:pt x="120000" y="120000"/>
-                </a:lnTo>
-                <a:lnTo>
-                  <a:pt x="0" y="120000"/>
-                </a:lnTo>
-                <a:close/>
-              </a:path>
-            </a:pathLst>
-          </a:custGeom>
-        </p:spPr>
-      </p:sp>
-      <p:sp>
-        <p:nvSpPr>
-          <p:cNvPr id="76" name="Google Shape;76;g30e3b1f18c4_0_78:notes"/>
-          <p:cNvSpPr txBox="1">
-            <a:spLocks noGrp="1"/>
-          </p:cNvSpPr>
-          <p:nvPr>
-            <p:ph type="body" idx="1"/>
-          </p:nvPr>
-        </p:nvSpPr>
-        <p:spPr>
-          <a:xfrm>
-            <a:off x="685800" y="4343400"/>
-            <a:ext cx="5486400" cy="4114800"/>
-          </a:xfrm>
-          <a:prstGeom prst="rect">
-            <a:avLst/>
-          </a:prstGeom>
-        </p:spPr>
-        <p:txBody>
-          <a:bodyPr spcFirstLastPara="1" wrap="square" lIns="91425" tIns="91425" rIns="91425" bIns="91425" anchor="t" anchorCtr="0">
-            <a:noAutofit/>
-          </a:bodyPr>
-          <a:lstStyle/>
-          <a:p>
-            <a:pPr marL="0" lvl="0" indent="0" algn="l" rtl="0">
-              <a:spcBef>
-                <a:spcPts val="0"/>
-              </a:spcBef>
-              <a:spcAft>
-                <a:spcPts val="0"/>
-              </a:spcAft>
-              <a:buNone/>
-            </a:pPr>
-            <a:endParaRPr/>
-          </a:p>
-        </p:txBody>
-      </p:sp>
-    </p:spTree>
-  </p:cSld>
-  <p:clrMapOvr>
-    <a:masterClrMapping/>
-  </p:clrMapOvr>
-</p:notes>
-</file>
-
-<file path=ppt/notesSlides/notesSlide3.xml><?xml version="1.0" encoding="utf-8"?>
-<p:notes xmlns:a="http://schemas.openxmlformats.org/drawingml/2006/main" xmlns:r="http://schemas.openxmlformats.org/officeDocument/2006/relationships" xmlns:p="http://schemas.openxmlformats.org/presentationml/2006/main" showMasterSp="0" showMasterPhAnim="0">
-  <p:cSld>
-    <p:spTree>
-      <p:nvGrpSpPr>
-        <p:cNvPr id="1" name="Shape 80"/>
-        <p:cNvGrpSpPr/>
-        <p:nvPr/>
-      </p:nvGrpSpPr>
-      <p:grpSpPr>
-        <a:xfrm>
-          <a:off x="0" y="0"/>
-          <a:ext cx="0" cy="0"/>
-          <a:chOff x="0" y="0"/>
-          <a:chExt cx="0" cy="0"/>
-        </a:xfrm>
-      </p:grpSpPr>
-      <p:sp>
-        <p:nvSpPr>
-          <p:cNvPr id="81" name="Google Shape;81;g31395230ebd_0_11:notes"/>
-          <p:cNvSpPr>
-            <a:spLocks noGrp="1" noRot="1" noChangeAspect="1"/>
-          </p:cNvSpPr>
-          <p:nvPr>
-            <p:ph type="sldImg" idx="2"/>
-          </p:nvPr>
-        </p:nvSpPr>
-        <p:spPr>
-          <a:xfrm>
-            <a:off x="381300" y="685800"/>
-            <a:ext cx="6096000" cy="3429000"/>
-          </a:xfrm>
-          <a:custGeom>
-            <a:avLst/>
-            <a:gdLst/>
-            <a:ahLst/>
-            <a:cxnLst/>
-            <a:rect l="l" t="t" r="r" b="b"/>
-            <a:pathLst>
-              <a:path w="120000" h="120000" extrusionOk="0">
-                <a:moveTo>
-                  <a:pt x="0" y="0"/>
-                </a:moveTo>
-                <a:lnTo>
-                  <a:pt x="120000" y="0"/>
-                </a:lnTo>
-                <a:lnTo>
-                  <a:pt x="120000" y="120000"/>
-                </a:lnTo>
-                <a:lnTo>
-                  <a:pt x="0" y="120000"/>
-                </a:lnTo>
-                <a:close/>
-              </a:path>
-            </a:pathLst>
-          </a:custGeom>
-        </p:spPr>
-      </p:sp>
-      <p:sp>
-        <p:nvSpPr>
-          <p:cNvPr id="82" name="Google Shape;82;g31395230ebd_0_11:notes"/>
-          <p:cNvSpPr txBox="1">
-            <a:spLocks noGrp="1"/>
-          </p:cNvSpPr>
-          <p:nvPr>
-            <p:ph type="body" idx="1"/>
-          </p:nvPr>
-        </p:nvSpPr>
-        <p:spPr>
-          <a:xfrm>
-            <a:off x="685800" y="4343400"/>
-            <a:ext cx="5486400" cy="4114800"/>
-          </a:xfrm>
-          <a:prstGeom prst="rect">
-            <a:avLst/>
-          </a:prstGeom>
-        </p:spPr>
-        <p:txBody>
-          <a:bodyPr spcFirstLastPara="1" wrap="square" lIns="91425" tIns="91425" rIns="91425" bIns="91425" anchor="t" anchorCtr="0">
-            <a:noAutofit/>
-          </a:bodyPr>
-          <a:lstStyle/>
-          <a:p>
-            <a:pPr marL="0" lvl="0" indent="0" algn="l" rtl="0">
-              <a:spcBef>
-                <a:spcPts val="0"/>
-              </a:spcBef>
-              <a:spcAft>
-                <a:spcPts val="0"/>
-              </a:spcAft>
-              <a:buNone/>
-            </a:pPr>
-            <a:endParaRPr/>
-          </a:p>
-        </p:txBody>
-      </p:sp>
-    </p:spTree>
-  </p:cSld>
-  <p:clrMapOvr>
-    <a:masterClrMapping/>
-  </p:clrMapOvr>
-</p:notes>
-</file>
-
-<file path=ppt/notesSlides/notesSlide4.xml><?xml version="1.0" encoding="utf-8"?>
-<p:notes xmlns:a="http://schemas.openxmlformats.org/drawingml/2006/main" xmlns:r="http://schemas.openxmlformats.org/officeDocument/2006/relationships" xmlns:p="http://schemas.openxmlformats.org/presentationml/2006/main" showMasterSp="0" showMasterPhAnim="0">
-  <p:cSld>
-    <p:spTree>
-      <p:nvGrpSpPr>
-        <p:cNvPr id="1" name="Shape 87"/>
-        <p:cNvGrpSpPr/>
-        <p:nvPr/>
-      </p:nvGrpSpPr>
-      <p:grpSpPr>
-        <a:xfrm>
-          <a:off x="0" y="0"/>
-          <a:ext cx="0" cy="0"/>
-          <a:chOff x="0" y="0"/>
-          <a:chExt cx="0" cy="0"/>
-        </a:xfrm>
-      </p:grpSpPr>
-      <p:sp>
-        <p:nvSpPr>
-          <p:cNvPr id="88" name="Google Shape;88;g30e3b1f18c4_0_83:notes"/>
-          <p:cNvSpPr>
-            <a:spLocks noGrp="1" noRot="1" noChangeAspect="1"/>
-          </p:cNvSpPr>
-          <p:nvPr>
-            <p:ph type="sldImg" idx="2"/>
-          </p:nvPr>
-        </p:nvSpPr>
-        <p:spPr>
-          <a:xfrm>
-            <a:off x="381300" y="685800"/>
-            <a:ext cx="6096000" cy="3429000"/>
-          </a:xfrm>
-          <a:custGeom>
-            <a:avLst/>
-            <a:gdLst/>
-            <a:ahLst/>
-            <a:cxnLst/>
-            <a:rect l="l" t="t" r="r" b="b"/>
-            <a:pathLst>
-              <a:path w="120000" h="120000" extrusionOk="0">
-                <a:moveTo>
-                  <a:pt x="0" y="0"/>
-                </a:moveTo>
-                <a:lnTo>
-                  <a:pt x="120000" y="0"/>
-                </a:lnTo>
-                <a:lnTo>
-                  <a:pt x="120000" y="120000"/>
-                </a:lnTo>
-                <a:lnTo>
-                  <a:pt x="0" y="120000"/>
-                </a:lnTo>
-                <a:close/>
-              </a:path>
-            </a:pathLst>
-          </a:custGeom>
-        </p:spPr>
-      </p:sp>
-      <p:sp>
-        <p:nvSpPr>
-          <p:cNvPr id="89" name="Google Shape;89;g30e3b1f18c4_0_83:notes"/>
-          <p:cNvSpPr txBox="1">
-            <a:spLocks noGrp="1"/>
-          </p:cNvSpPr>
-          <p:nvPr>
-            <p:ph type="body" idx="1"/>
-          </p:nvPr>
-        </p:nvSpPr>
-        <p:spPr>
-          <a:xfrm>
-            <a:off x="685800" y="4343400"/>
-            <a:ext cx="5486400" cy="4114800"/>
-          </a:xfrm>
-          <a:prstGeom prst="rect">
-            <a:avLst/>
-          </a:prstGeom>
-        </p:spPr>
-        <p:txBody>
-          <a:bodyPr spcFirstLastPara="1" wrap="square" lIns="91425" tIns="91425" rIns="91425" bIns="91425" anchor="t" anchorCtr="0">
-            <a:noAutofit/>
-          </a:bodyPr>
-          <a:lstStyle/>
-          <a:p>
-            <a:pPr marL="0" lvl="0" indent="0" algn="l" rtl="0">
-              <a:spcBef>
-                <a:spcPts val="0"/>
-              </a:spcBef>
-              <a:spcAft>
-                <a:spcPts val="0"/>
-              </a:spcAft>
-              <a:buNone/>
-            </a:pPr>
-            <a:endParaRPr/>
-          </a:p>
-        </p:txBody>
-      </p:sp>
-    </p:spTree>
-  </p:cSld>
-  <p:clrMapOvr>
-    <a:masterClrMapping/>
-  </p:clrMapOvr>
-</p:notes>
-</file>
-
-<file path=ppt/notesSlides/notesSlide5.xml><?xml version="1.0" encoding="utf-8"?>
-<p:notes xmlns:a="http://schemas.openxmlformats.org/drawingml/2006/main" xmlns:r="http://schemas.openxmlformats.org/officeDocument/2006/relationships" xmlns:p="http://schemas.openxmlformats.org/presentationml/2006/main" showMasterSp="0" showMasterPhAnim="0">
-  <p:cSld>
-    <p:spTree>
-      <p:nvGrpSpPr>
-        <p:cNvPr id="1" name="Shape 95"/>
-        <p:cNvGrpSpPr/>
-        <p:nvPr/>
-      </p:nvGrpSpPr>
-      <p:grpSpPr>
-        <a:xfrm>
-          <a:off x="0" y="0"/>
-          <a:ext cx="0" cy="0"/>
-          <a:chOff x="0" y="0"/>
-          <a:chExt cx="0" cy="0"/>
-        </a:xfrm>
-      </p:grpSpPr>
-      <p:sp>
-        <p:nvSpPr>
-          <p:cNvPr id="96" name="Google Shape;96;g30e3b1f18c4_0_90:notes"/>
-          <p:cNvSpPr>
-            <a:spLocks noGrp="1" noRot="1" noChangeAspect="1"/>
-          </p:cNvSpPr>
-          <p:nvPr>
-            <p:ph type="sldImg" idx="2"/>
-          </p:nvPr>
-        </p:nvSpPr>
-        <p:spPr>
-          <a:xfrm>
-            <a:off x="381300" y="685800"/>
-            <a:ext cx="6096000" cy="3429000"/>
-          </a:xfrm>
-          <a:custGeom>
-            <a:avLst/>
-            <a:gdLst/>
-            <a:ahLst/>
-            <a:cxnLst/>
-            <a:rect l="l" t="t" r="r" b="b"/>
-            <a:pathLst>
-              <a:path w="120000" h="120000" extrusionOk="0">
-                <a:moveTo>
-                  <a:pt x="0" y="0"/>
-                </a:moveTo>
-                <a:lnTo>
-                  <a:pt x="120000" y="0"/>
-                </a:lnTo>
-                <a:lnTo>
-                  <a:pt x="120000" y="120000"/>
-                </a:lnTo>
-                <a:lnTo>
-                  <a:pt x="0" y="120000"/>
-                </a:lnTo>
-                <a:close/>
-              </a:path>
-            </a:pathLst>
-          </a:custGeom>
-        </p:spPr>
-      </p:sp>
-      <p:sp>
-        <p:nvSpPr>
-          <p:cNvPr id="97" name="Google Shape;97;g30e3b1f18c4_0_90:notes"/>
-          <p:cNvSpPr txBox="1">
-            <a:spLocks noGrp="1"/>
-          </p:cNvSpPr>
-          <p:nvPr>
-            <p:ph type="body" idx="1"/>
-          </p:nvPr>
-        </p:nvSpPr>
-        <p:spPr>
-          <a:xfrm>
-            <a:off x="685800" y="4343400"/>
-            <a:ext cx="5486400" cy="4114800"/>
-          </a:xfrm>
-          <a:prstGeom prst="rect">
-            <a:avLst/>
-          </a:prstGeom>
-        </p:spPr>
-        <p:txBody>
-          <a:bodyPr spcFirstLastPara="1" wrap="square" lIns="91425" tIns="91425" rIns="91425" bIns="91425" anchor="t" anchorCtr="0">
-            <a:noAutofit/>
-          </a:bodyPr>
-          <a:lstStyle/>
-          <a:p>
-            <a:pPr marL="0" lvl="0" indent="0" algn="l" rtl="0">
-              <a:spcBef>
-                <a:spcPts val="0"/>
-              </a:spcBef>
-              <a:spcAft>
-                <a:spcPts val="0"/>
-              </a:spcAft>
-              <a:buNone/>
-            </a:pPr>
-            <a:endParaRPr/>
-          </a:p>
-        </p:txBody>
-      </p:sp>
-    </p:spTree>
-  </p:cSld>
-  <p:clrMapOvr>
-    <a:masterClrMapping/>
-  </p:clrMapOvr>
-</p:notes>
-</file>
-
-<file path=ppt/notesSlides/notesSlide6.xml><?xml version="1.0" encoding="utf-8"?>
-<p:notes xmlns:a="http://schemas.openxmlformats.org/drawingml/2006/main" xmlns:r="http://schemas.openxmlformats.org/officeDocument/2006/relationships" xmlns:p="http://schemas.openxmlformats.org/presentationml/2006/main" showMasterSp="0" showMasterPhAnim="0">
-  <p:cSld>
-    <p:spTree>
-      <p:nvGrpSpPr>
-        <p:cNvPr id="1" name="Shape 101"/>
-        <p:cNvGrpSpPr/>
-        <p:nvPr/>
-      </p:nvGrpSpPr>
-      <p:grpSpPr>
-        <a:xfrm>
-          <a:off x="0" y="0"/>
-          <a:ext cx="0" cy="0"/>
-          <a:chOff x="0" y="0"/>
-          <a:chExt cx="0" cy="0"/>
-        </a:xfrm>
-      </p:grpSpPr>
-      <p:sp>
-        <p:nvSpPr>
-          <p:cNvPr id="102" name="Google Shape;102;g31395230ebd_0_20:notes"/>
-          <p:cNvSpPr>
-            <a:spLocks noGrp="1" noRot="1" noChangeAspect="1"/>
-          </p:cNvSpPr>
-          <p:nvPr>
-            <p:ph type="sldImg" idx="2"/>
-          </p:nvPr>
-        </p:nvSpPr>
-        <p:spPr>
-          <a:xfrm>
-            <a:off x="381300" y="685800"/>
-            <a:ext cx="6096000" cy="3429000"/>
-          </a:xfrm>
-          <a:custGeom>
-            <a:avLst/>
-            <a:gdLst/>
-            <a:ahLst/>
-            <a:cxnLst/>
-            <a:rect l="l" t="t" r="r" b="b"/>
-            <a:pathLst>
-              <a:path w="120000" h="120000" extrusionOk="0">
-                <a:moveTo>
-                  <a:pt x="0" y="0"/>
-                </a:moveTo>
-                <a:lnTo>
-                  <a:pt x="120000" y="0"/>
-                </a:lnTo>
-                <a:lnTo>
-                  <a:pt x="120000" y="120000"/>
-                </a:lnTo>
-                <a:lnTo>
-                  <a:pt x="0" y="120000"/>
-                </a:lnTo>
-                <a:close/>
-              </a:path>
-            </a:pathLst>
-          </a:custGeom>
-        </p:spPr>
-      </p:sp>
-      <p:sp>
-        <p:nvSpPr>
-          <p:cNvPr id="103" name="Google Shape;103;g31395230ebd_0_20:notes"/>
-          <p:cNvSpPr txBox="1">
-            <a:spLocks noGrp="1"/>
-          </p:cNvSpPr>
-          <p:nvPr>
-            <p:ph type="body" idx="1"/>
-          </p:nvPr>
-        </p:nvSpPr>
-        <p:spPr>
-          <a:xfrm>
-            <a:off x="685800" y="4343400"/>
-            <a:ext cx="5486400" cy="4114800"/>
-          </a:xfrm>
-          <a:prstGeom prst="rect">
-            <a:avLst/>
-          </a:prstGeom>
-        </p:spPr>
-        <p:txBody>
-          <a:bodyPr spcFirstLastPara="1" wrap="square" lIns="91425" tIns="91425" rIns="91425" bIns="91425" anchor="t" anchorCtr="0">
-            <a:noAutofit/>
-          </a:bodyPr>
-          <a:lstStyle/>
-          <a:p>
-            <a:pPr marL="0" lvl="0" indent="0" algn="l" rtl="0">
-              <a:spcBef>
-                <a:spcPts val="0"/>
-              </a:spcBef>
-              <a:spcAft>
-                <a:spcPts val="0"/>
-              </a:spcAft>
-              <a:buNone/>
-            </a:pPr>
-            <a:endParaRPr/>
-          </a:p>
-        </p:txBody>
-      </p:sp>
-    </p:spTree>
-  </p:cSld>
-  <p:clrMapOvr>
-    <a:masterClrMapping/>
-  </p:clrMapOvr>
-</p:notes>
-</file>
-
-<file path=ppt/notesSlides/notesSlide7.xml><?xml version="1.0" encoding="utf-8"?>
-<p:notes xmlns:a="http://schemas.openxmlformats.org/drawingml/2006/main" xmlns:r="http://schemas.openxmlformats.org/officeDocument/2006/relationships" xmlns:p="http://schemas.openxmlformats.org/presentationml/2006/main" showMasterSp="0" showMasterPhAnim="0">
-  <p:cSld>
-    <p:spTree>
-      <p:nvGrpSpPr>
-        <p:cNvPr id="1" name="Shape 109"/>
-        <p:cNvGrpSpPr/>
-        <p:nvPr/>
-      </p:nvGrpSpPr>
-      <p:grpSpPr>
-        <a:xfrm>
-          <a:off x="0" y="0"/>
-          <a:ext cx="0" cy="0"/>
-          <a:chOff x="0" y="0"/>
-          <a:chExt cx="0" cy="0"/>
-        </a:xfrm>
-      </p:grpSpPr>
-      <p:sp>
-        <p:nvSpPr>
-          <p:cNvPr id="110" name="Google Shape;110;g30e3b1f18c4_0_100:notes"/>
-          <p:cNvSpPr>
-            <a:spLocks noGrp="1" noRot="1" noChangeAspect="1"/>
-          </p:cNvSpPr>
-          <p:nvPr>
-            <p:ph type="sldImg" idx="2"/>
-          </p:nvPr>
-        </p:nvSpPr>
-        <p:spPr>
-          <a:xfrm>
-            <a:off x="381300" y="685800"/>
-            <a:ext cx="6096000" cy="3429000"/>
-          </a:xfrm>
-          <a:custGeom>
-            <a:avLst/>
-            <a:gdLst/>
-            <a:ahLst/>
-            <a:cxnLst/>
-            <a:rect l="l" t="t" r="r" b="b"/>
-            <a:pathLst>
-              <a:path w="120000" h="120000" extrusionOk="0">
-                <a:moveTo>
-                  <a:pt x="0" y="0"/>
-                </a:moveTo>
-                <a:lnTo>
-                  <a:pt x="120000" y="0"/>
-                </a:lnTo>
-                <a:lnTo>
-                  <a:pt x="120000" y="120000"/>
-                </a:lnTo>
-                <a:lnTo>
-                  <a:pt x="0" y="120000"/>
-                </a:lnTo>
-                <a:close/>
-              </a:path>
-            </a:pathLst>
-          </a:custGeom>
-        </p:spPr>
-      </p:sp>
-      <p:sp>
-        <p:nvSpPr>
-          <p:cNvPr id="111" name="Google Shape;111;g30e3b1f18c4_0_100:notes"/>
-          <p:cNvSpPr txBox="1">
-            <a:spLocks noGrp="1"/>
-          </p:cNvSpPr>
-          <p:nvPr>
-            <p:ph type="body" idx="1"/>
-          </p:nvPr>
-        </p:nvSpPr>
-        <p:spPr>
-          <a:xfrm>
-            <a:off x="685800" y="4343400"/>
-            <a:ext cx="5486400" cy="4114800"/>
-          </a:xfrm>
-          <a:prstGeom prst="rect">
-            <a:avLst/>
-          </a:prstGeom>
-        </p:spPr>
-        <p:txBody>
-          <a:bodyPr spcFirstLastPara="1" wrap="square" lIns="91425" tIns="91425" rIns="91425" bIns="91425" anchor="t" anchorCtr="0">
-            <a:noAutofit/>
-          </a:bodyPr>
-          <a:lstStyle/>
-          <a:p>
-            <a:pPr marL="0" lvl="0" indent="0" algn="l" rtl="0">
-              <a:spcBef>
-                <a:spcPts val="0"/>
-              </a:spcBef>
-              <a:spcAft>
-                <a:spcPts val="0"/>
-              </a:spcAft>
-              <a:buNone/>
-            </a:pPr>
-            <a:endParaRPr/>
-          </a:p>
-        </p:txBody>
-      </p:sp>
-    </p:spTree>
-  </p:cSld>
-  <p:clrMapOvr>
-    <a:masterClrMapping/>
-  </p:clrMapOvr>
-</p:notes>
-</file>
-
-<file path=ppt/notesSlides/notesSlide8.xml><?xml version="1.0" encoding="utf-8"?>
-<p:notes xmlns:a="http://schemas.openxmlformats.org/drawingml/2006/main" xmlns:r="http://schemas.openxmlformats.org/officeDocument/2006/relationships" xmlns:p="http://schemas.openxmlformats.org/presentationml/2006/main" showMasterSp="0" showMasterPhAnim="0">
-  <p:cSld>
-    <p:spTree>
-      <p:nvGrpSpPr>
-        <p:cNvPr id="1" name="Shape 115"/>
-        <p:cNvGrpSpPr/>
-        <p:nvPr/>
-      </p:nvGrpSpPr>
-      <p:grpSpPr>
-        <a:xfrm>
-          <a:off x="0" y="0"/>
-          <a:ext cx="0" cy="0"/>
-          <a:chOff x="0" y="0"/>
-          <a:chExt cx="0" cy="0"/>
-        </a:xfrm>
-      </p:grpSpPr>
-      <p:sp>
-        <p:nvSpPr>
-          <p:cNvPr id="116" name="Google Shape;116;g30e3b1f18c4_0_107:notes"/>
-          <p:cNvSpPr>
-            <a:spLocks noGrp="1" noRot="1" noChangeAspect="1"/>
-          </p:cNvSpPr>
-          <p:nvPr>
-            <p:ph type="sldImg" idx="2"/>
-          </p:nvPr>
-        </p:nvSpPr>
-        <p:spPr>
-          <a:xfrm>
-            <a:off x="381300" y="685800"/>
-            <a:ext cx="6096000" cy="3429000"/>
-          </a:xfrm>
-          <a:custGeom>
-            <a:avLst/>
-            <a:gdLst/>
-            <a:ahLst/>
-            <a:cxnLst/>
-            <a:rect l="l" t="t" r="r" b="b"/>
-            <a:pathLst>
-              <a:path w="120000" h="120000" extrusionOk="0">
-                <a:moveTo>
-                  <a:pt x="0" y="0"/>
-                </a:moveTo>
-                <a:lnTo>
-                  <a:pt x="120000" y="0"/>
-                </a:lnTo>
-                <a:lnTo>
-                  <a:pt x="120000" y="120000"/>
-                </a:lnTo>
-                <a:lnTo>
-                  <a:pt x="0" y="120000"/>
-                </a:lnTo>
-                <a:close/>
-              </a:path>
-            </a:pathLst>
-          </a:custGeom>
-        </p:spPr>
-      </p:sp>
-      <p:sp>
-        <p:nvSpPr>
-          <p:cNvPr id="117" name="Google Shape;117;g30e3b1f18c4_0_107:notes"/>
-          <p:cNvSpPr txBox="1">
-            <a:spLocks noGrp="1"/>
-          </p:cNvSpPr>
-          <p:nvPr>
-            <p:ph type="body" idx="1"/>
-          </p:nvPr>
-        </p:nvSpPr>
-        <p:spPr>
-          <a:xfrm>
-            <a:off x="685800" y="4343400"/>
-            <a:ext cx="5486400" cy="4114800"/>
-          </a:xfrm>
-          <a:prstGeom prst="rect">
-            <a:avLst/>
-          </a:prstGeom>
-        </p:spPr>
-        <p:txBody>
-          <a:bodyPr spcFirstLastPara="1" wrap="square" lIns="91425" tIns="91425" rIns="91425" bIns="91425" anchor="t" anchorCtr="0">
-            <a:noAutofit/>
-          </a:bodyPr>
-          <a:lstStyle/>
-          <a:p>
-            <a:pPr marL="0" lvl="0" indent="0" algn="l" rtl="0">
-              <a:spcBef>
-                <a:spcPts val="0"/>
-              </a:spcBef>
-              <a:spcAft>
-                <a:spcPts val="0"/>
-              </a:spcAft>
-              <a:buNone/>
-            </a:pPr>
-            <a:endParaRPr/>
-          </a:p>
-        </p:txBody>
-      </p:sp>
-    </p:spTree>
-  </p:cSld>
-  <p:clrMapOvr>
-    <a:masterClrMapping/>
-  </p:clrMapOvr>
-</p:notes>
-</file>
-
-<file path=ppt/notesSlides/notesSlide9.xml><?xml version="1.0" encoding="utf-8"?>
-<p:notes xmlns:a="http://schemas.openxmlformats.org/drawingml/2006/main" xmlns:r="http://schemas.openxmlformats.org/officeDocument/2006/relationships" xmlns:p="http://schemas.openxmlformats.org/presentationml/2006/main" showMasterSp="0" showMasterPhAnim="0">
-  <p:cSld>
-    <p:spTree>
-      <p:nvGrpSpPr>
-        <p:cNvPr id="1" name="Shape 122"/>
-        <p:cNvGrpSpPr/>
-        <p:nvPr/>
-      </p:nvGrpSpPr>
-      <p:grpSpPr>
-        <a:xfrm>
-          <a:off x="0" y="0"/>
-          <a:ext cx="0" cy="0"/>
-          <a:chOff x="0" y="0"/>
-          <a:chExt cx="0" cy="0"/>
-        </a:xfrm>
-      </p:grpSpPr>
-      <p:sp>
-        <p:nvSpPr>
-          <p:cNvPr id="123" name="Google Shape;123;g313bef51e5b_0_2:notes"/>
-          <p:cNvSpPr>
-            <a:spLocks noGrp="1" noRot="1" noChangeAspect="1"/>
-          </p:cNvSpPr>
-          <p:nvPr>
-            <p:ph type="sldImg" idx="2"/>
-          </p:nvPr>
-        </p:nvSpPr>
-        <p:spPr>
-          <a:xfrm>
-            <a:off x="381300" y="685800"/>
-            <a:ext cx="6096000" cy="3429000"/>
-          </a:xfrm>
-          <a:custGeom>
-            <a:avLst/>
-            <a:gdLst/>
-            <a:ahLst/>
-            <a:cxnLst/>
-            <a:rect l="l" t="t" r="r" b="b"/>
-            <a:pathLst>
-              <a:path w="120000" h="120000" extrusionOk="0">
-                <a:moveTo>
-                  <a:pt x="0" y="0"/>
-                </a:moveTo>
-                <a:lnTo>
-                  <a:pt x="120000" y="0"/>
-                </a:lnTo>
-                <a:lnTo>
-                  <a:pt x="120000" y="120000"/>
-                </a:lnTo>
-                <a:lnTo>
-                  <a:pt x="0" y="120000"/>
-                </a:lnTo>
-                <a:close/>
-              </a:path>
-            </a:pathLst>
-          </a:custGeom>
-        </p:spPr>
-      </p:sp>
-      <p:sp>
-        <p:nvSpPr>
-          <p:cNvPr id="124" name="Google Shape;124;g313bef51e5b_0_2:notes"/>
-          <p:cNvSpPr txBox="1">
-            <a:spLocks noGrp="1"/>
-          </p:cNvSpPr>
-          <p:nvPr>
-            <p:ph type="body" idx="1"/>
-          </p:nvPr>
-        </p:nvSpPr>
-        <p:spPr>
-          <a:xfrm>
-            <a:off x="685800" y="4343400"/>
-            <a:ext cx="5486400" cy="4114800"/>
-          </a:xfrm>
-          <a:prstGeom prst="rect">
-            <a:avLst/>
-          </a:prstGeom>
-        </p:spPr>
-        <p:txBody>
-          <a:bodyPr spcFirstLastPara="1" wrap="square" lIns="91425" tIns="91425" rIns="91425" bIns="91425" anchor="t" anchorCtr="0">
-            <a:noAutofit/>
-          </a:bodyPr>
-          <a:lstStyle/>
-          <a:p>
-            <a:pPr marL="0" lvl="0" indent="0" algn="l" rtl="0">
-              <a:spcBef>
-                <a:spcPts val="0"/>
-              </a:spcBef>
-              <a:spcAft>
-                <a:spcPts val="0"/>
-              </a:spcAft>
-              <a:buNone/>
-            </a:pPr>
-            <a:endParaRPr/>
-          </a:p>
-        </p:txBody>
-      </p:sp>
-    </p:spTree>
-  </p:cSld>
-  <p:clrMapOvr>
-    <a:masterClrMapping/>
-  </p:clrMapOvr>
-</p:notes>
-</file>
-
 <file path=ppt/slideLayouts/slideLayout1.xml><?xml version="1.0" encoding="utf-8"?>
 <p:sldLayout xmlns:a="http://schemas.openxmlformats.org/drawingml/2006/main" xmlns:r="http://schemas.openxmlformats.org/officeDocument/2006/relationships" xmlns:p="http://schemas.openxmlformats.org/presentationml/2006/main" matchingName="Title slide" type="title">
   <p:cSld name="TITLE">
-    <p:bg>
-      <p:bgPr>
-        <a:solidFill>
-          <a:schemeClr val="dk1"/>
-        </a:solidFill>
-        <a:effectLst/>
-      </p:bgPr>
-    </p:bg>
     <p:spTree>
       <p:nvGrpSpPr>
         <p:cNvPr id="1" name="Shape 9"/>
@@ -3354,14 +2717,6 @@
 <file path=ppt/slideLayouts/slideLayout2.xml><?xml version="1.0" encoding="utf-8"?>
 <p:sldLayout xmlns:a="http://schemas.openxmlformats.org/drawingml/2006/main" xmlns:r="http://schemas.openxmlformats.org/officeDocument/2006/relationships" xmlns:p="http://schemas.openxmlformats.org/presentationml/2006/main" matchingName="Section header" type="secHead">
   <p:cSld name="SECTION_HEADER">
-    <p:bg>
-      <p:bgPr>
-        <a:solidFill>
-          <a:schemeClr val="dk1"/>
-        </a:solidFill>
-        <a:effectLst/>
-      </p:bgPr>
-    </p:bg>
     <p:spTree>
       <p:nvGrpSpPr>
         <p:cNvPr id="1" name="Shape 16"/>
@@ -5376,14 +4731,6 @@
 <file path=ppt/slideLayouts/slideLayout7.xml><?xml version="1.0" encoding="utf-8"?>
 <p:sldLayout xmlns:a="http://schemas.openxmlformats.org/drawingml/2006/main" xmlns:r="http://schemas.openxmlformats.org/officeDocument/2006/relationships" xmlns:p="http://schemas.openxmlformats.org/presentationml/2006/main" matchingName="Main point">
   <p:cSld name="MAIN_POINT">
-    <p:bg>
-      <p:bgPr>
-        <a:solidFill>
-          <a:schemeClr val="lt2"/>
-        </a:solidFill>
-        <a:effectLst/>
-      </p:bgPr>
-    </p:bg>
     <p:spTree>
       <p:nvGrpSpPr>
         <p:cNvPr id="1" name="Shape 44"/>
@@ -6691,7 +6038,9 @@
     <p:bg>
       <p:bgPr>
         <a:solidFill>
-          <a:schemeClr val="lt1"/>
+          <a:schemeClr val="tx1">
+            <a:lumMod val="75000"/>
+          </a:schemeClr>
         </a:solidFill>
         <a:effectLst/>
       </p:bgPr>
@@ -7396,7 +6745,7 @@
         <p:push/>
       </p:transition>
     </mc:Choice>
-    <mc:Fallback xmlns:ahyp="http://schemas.microsoft.com/office/drawing/2018/hyperlinkcolor" xmlns:p15="http://schemas.microsoft.com/office/powerpoint/2012/main" xmlns:com="http://schemas.openxmlformats.org/drawingml/2006/compatibility" xmlns:pvml="urn:schemas-microsoft-com:office:powerpoint" xmlns:v="urn:schemas-microsoft-com:vml" xmlns:o="urn:schemas-microsoft-com:office:office" xmlns:dgm="http://schemas.openxmlformats.org/drawingml/2006/diagram" xmlns:c="http://schemas.openxmlformats.org/drawingml/2006/chart" xmlns:mv="urn:schemas-microsoft-com:mac:vml" xmlns="">
+    <mc:Fallback xmlns="" xmlns:mv="urn:schemas-microsoft-com:mac:vml" xmlns:c="http://schemas.openxmlformats.org/drawingml/2006/chart" xmlns:dgm="http://schemas.openxmlformats.org/drawingml/2006/diagram" xmlns:o="urn:schemas-microsoft-com:office:office" xmlns:v="urn:schemas-microsoft-com:vml" xmlns:pvml="urn:schemas-microsoft-com:office:powerpoint" xmlns:com="http://schemas.openxmlformats.org/drawingml/2006/compatibility" xmlns:p15="http://schemas.microsoft.com/office/powerpoint/2012/main" xmlns:ahyp="http://schemas.microsoft.com/office/drawing/2018/hyperlinkcolor">
       <p:transition spd="slow">
         <p:fade/>
       </p:transition>
@@ -8098,22 +7447,6 @@
 <file path=ppt/slides/slide1.xml><?xml version="1.0" encoding="utf-8"?>
 <p:sld xmlns:a="http://schemas.openxmlformats.org/drawingml/2006/main" xmlns:r="http://schemas.openxmlformats.org/officeDocument/2006/relationships" xmlns:p="http://schemas.openxmlformats.org/presentationml/2006/main">
   <p:cSld>
-    <p:bg>
-      <p:bgPr>
-        <a:gradFill>
-          <a:gsLst>
-            <a:gs pos="0">
-              <a:schemeClr val="accent3"/>
-            </a:gs>
-            <a:gs pos="100000">
-              <a:schemeClr val="dk1"/>
-            </a:gs>
-          </a:gsLst>
-          <a:lin ang="5400012" scaled="0"/>
-        </a:gradFill>
-        <a:effectLst/>
-      </p:bgPr>
-    </p:bg>
     <p:spTree>
       <p:nvGrpSpPr>
         <p:cNvPr id="1" name="Shape 71"/>
@@ -8252,25 +7585,708 @@
 </p:sld>
 </file>
 
-<file path=ppt/slides/slide10.xml><?xml version="1.0" encoding="utf-8"?>
+<file path=ppt/slides/slide2.xml><?xml version="1.0" encoding="utf-8"?>
 <p:sld xmlns:a="http://schemas.openxmlformats.org/drawingml/2006/main" xmlns:r="http://schemas.openxmlformats.org/officeDocument/2006/relationships" xmlns:p="http://schemas.openxmlformats.org/presentationml/2006/main">
   <p:cSld>
-    <p:bg>
-      <p:bgPr>
-        <a:gradFill>
-          <a:gsLst>
-            <a:gs pos="0">
-              <a:schemeClr val="accent3"/>
-            </a:gs>
-            <a:gs pos="100000">
-              <a:schemeClr val="dk1"/>
-            </a:gs>
-          </a:gsLst>
-          <a:lin ang="5400012" scaled="0"/>
-        </a:gradFill>
-        <a:effectLst/>
-      </p:bgPr>
-    </p:bg>
+    <p:spTree>
+      <p:nvGrpSpPr>
+        <p:cNvPr id="1" name="Shape 77"/>
+        <p:cNvGrpSpPr/>
+        <p:nvPr/>
+      </p:nvGrpSpPr>
+      <p:grpSpPr>
+        <a:xfrm>
+          <a:off x="0" y="0"/>
+          <a:ext cx="0" cy="0"/>
+          <a:chOff x="0" y="0"/>
+          <a:chExt cx="0" cy="0"/>
+        </a:xfrm>
+      </p:grpSpPr>
+      <p:sp>
+        <p:nvSpPr>
+          <p:cNvPr id="78" name="Google Shape;78;p14"/>
+          <p:cNvSpPr txBox="1">
+            <a:spLocks noGrp="1"/>
+          </p:cNvSpPr>
+          <p:nvPr>
+            <p:ph type="ctrTitle"/>
+          </p:nvPr>
+        </p:nvSpPr>
+        <p:spPr>
+          <a:xfrm>
+            <a:off x="2371725" y="630225"/>
+            <a:ext cx="6331500" cy="913200"/>
+          </a:xfrm>
+          <a:prstGeom prst="rect">
+            <a:avLst/>
+          </a:prstGeom>
+        </p:spPr>
+        <p:txBody>
+          <a:bodyPr spcFirstLastPara="1" wrap="square" lIns="91425" tIns="91425" rIns="91425" bIns="91425" anchor="t" anchorCtr="0">
+            <a:normAutofit fontScale="90000"/>
+          </a:bodyPr>
+          <a:lstStyle/>
+          <a:p>
+            <a:pPr marL="0" lvl="0" indent="0" algn="l" rtl="0">
+              <a:spcBef>
+                <a:spcPts val="0"/>
+              </a:spcBef>
+              <a:spcAft>
+                <a:spcPts val="0"/>
+              </a:spcAft>
+              <a:buNone/>
+            </a:pPr>
+            <a:r>
+              <a:rPr lang="en" dirty="0"/>
+              <a:t>Overview</a:t>
+            </a:r>
+            <a:endParaRPr dirty="0"/>
+          </a:p>
+        </p:txBody>
+      </p:sp>
+      <p:sp>
+        <p:nvSpPr>
+          <p:cNvPr id="79" name="Google Shape;79;p14"/>
+          <p:cNvSpPr txBox="1">
+            <a:spLocks noGrp="1"/>
+          </p:cNvSpPr>
+          <p:nvPr>
+            <p:ph type="subTitle" idx="1"/>
+          </p:nvPr>
+        </p:nvSpPr>
+        <p:spPr>
+          <a:xfrm>
+            <a:off x="2390275" y="1629150"/>
+            <a:ext cx="6331500" cy="2031900"/>
+          </a:xfrm>
+          <a:prstGeom prst="rect">
+            <a:avLst/>
+          </a:prstGeom>
+        </p:spPr>
+        <p:txBody>
+          <a:bodyPr spcFirstLastPara="1" wrap="square" lIns="91425" tIns="91425" rIns="91425" bIns="91425" anchor="b" anchorCtr="0">
+            <a:spAutoFit/>
+          </a:bodyPr>
+          <a:lstStyle/>
+          <a:p>
+            <a:pPr marL="457200" lvl="0" indent="-355600" algn="l" rtl="0">
+              <a:spcBef>
+                <a:spcPts val="0"/>
+              </a:spcBef>
+              <a:spcAft>
+                <a:spcPts val="0"/>
+              </a:spcAft>
+              <a:buSzPts val="2000"/>
+              <a:buFont typeface="Oswald"/>
+              <a:buChar char="●"/>
+            </a:pPr>
+            <a:r>
+              <a:rPr lang="en" sz="2000" dirty="0">
+                <a:latin typeface="Oswald"/>
+                <a:ea typeface="Oswald"/>
+                <a:cs typeface="Oswald"/>
+                <a:sym typeface="Oswald"/>
+              </a:rPr>
+              <a:t>LingoLizard is a tool designed to help people learn languages using real time lessons and conversations. </a:t>
+            </a:r>
+            <a:endParaRPr sz="2000" dirty="0">
+              <a:latin typeface="Oswald"/>
+              <a:ea typeface="Oswald"/>
+              <a:cs typeface="Oswald"/>
+              <a:sym typeface="Oswald"/>
+            </a:endParaRPr>
+          </a:p>
+          <a:p>
+            <a:pPr marL="457200" lvl="0" indent="-355600" algn="l" rtl="0">
+              <a:spcBef>
+                <a:spcPts val="0"/>
+              </a:spcBef>
+              <a:spcAft>
+                <a:spcPts val="0"/>
+              </a:spcAft>
+              <a:buSzPts val="2000"/>
+              <a:buFont typeface="Oswald"/>
+              <a:buChar char="●"/>
+            </a:pPr>
+            <a:r>
+              <a:rPr lang="en" sz="2000" dirty="0">
+                <a:latin typeface="Oswald"/>
+                <a:ea typeface="Oswald"/>
+                <a:cs typeface="Oswald"/>
+                <a:sym typeface="Oswald"/>
+              </a:rPr>
+              <a:t>It will do this using AI to simulate interactions in different languages.</a:t>
+            </a:r>
+            <a:endParaRPr sz="2000" dirty="0">
+              <a:latin typeface="Oswald"/>
+              <a:ea typeface="Oswald"/>
+              <a:cs typeface="Oswald"/>
+              <a:sym typeface="Oswald"/>
+            </a:endParaRPr>
+          </a:p>
+          <a:p>
+            <a:pPr marL="457200" lvl="0" indent="-355600" algn="l" rtl="0">
+              <a:spcBef>
+                <a:spcPts val="0"/>
+              </a:spcBef>
+              <a:spcAft>
+                <a:spcPts val="0"/>
+              </a:spcAft>
+              <a:buSzPts val="2000"/>
+              <a:buFont typeface="Oswald"/>
+              <a:buChar char="●"/>
+            </a:pPr>
+            <a:r>
+              <a:rPr lang="en" sz="2000" dirty="0">
+                <a:latin typeface="Oswald"/>
+                <a:ea typeface="Oswald"/>
+                <a:cs typeface="Oswald"/>
+                <a:sym typeface="Oswald"/>
+              </a:rPr>
+              <a:t>It will be able to give real time feedback and corrections to spelling and grammar.</a:t>
+            </a:r>
+            <a:endParaRPr sz="2000" dirty="0">
+              <a:latin typeface="Oswald"/>
+              <a:ea typeface="Oswald"/>
+              <a:cs typeface="Oswald"/>
+              <a:sym typeface="Oswald"/>
+            </a:endParaRPr>
+          </a:p>
+        </p:txBody>
+      </p:sp>
+    </p:spTree>
+  </p:cSld>
+  <p:clrMapOvr>
+    <a:masterClrMapping/>
+  </p:clrMapOvr>
+</p:sld>
+</file>
+
+<file path=ppt/slides/slide3.xml><?xml version="1.0" encoding="utf-8"?>
+<p:sld xmlns:a="http://schemas.openxmlformats.org/drawingml/2006/main" xmlns:r="http://schemas.openxmlformats.org/officeDocument/2006/relationships" xmlns:p="http://schemas.openxmlformats.org/presentationml/2006/main">
+  <p:cSld>
+    <p:spTree>
+      <p:nvGrpSpPr>
+        <p:cNvPr id="1" name="Shape 104"/>
+        <p:cNvGrpSpPr/>
+        <p:nvPr/>
+      </p:nvGrpSpPr>
+      <p:grpSpPr>
+        <a:xfrm>
+          <a:off x="0" y="0"/>
+          <a:ext cx="0" cy="0"/>
+          <a:chOff x="0" y="0"/>
+          <a:chExt cx="0" cy="0"/>
+        </a:xfrm>
+      </p:grpSpPr>
+      <p:sp>
+        <p:nvSpPr>
+          <p:cNvPr id="105" name="Google Shape;105;p18"/>
+          <p:cNvSpPr txBox="1">
+            <a:spLocks noGrp="1"/>
+          </p:cNvSpPr>
+          <p:nvPr>
+            <p:ph type="ctrTitle"/>
+          </p:nvPr>
+        </p:nvSpPr>
+        <p:spPr>
+          <a:xfrm>
+            <a:off x="2371725" y="630225"/>
+            <a:ext cx="6331500" cy="905400"/>
+          </a:xfrm>
+          <a:prstGeom prst="rect">
+            <a:avLst/>
+          </a:prstGeom>
+        </p:spPr>
+        <p:txBody>
+          <a:bodyPr spcFirstLastPara="1" wrap="square" lIns="91425" tIns="91425" rIns="91425" bIns="91425" anchor="t" anchorCtr="0">
+            <a:normAutofit fontScale="90000"/>
+          </a:bodyPr>
+          <a:lstStyle/>
+          <a:p>
+            <a:pPr marL="0" lvl="0" indent="0" algn="l" rtl="0">
+              <a:spcBef>
+                <a:spcPts val="0"/>
+              </a:spcBef>
+              <a:spcAft>
+                <a:spcPts val="0"/>
+              </a:spcAft>
+              <a:buClr>
+                <a:schemeClr val="dk2"/>
+              </a:buClr>
+              <a:buSzPts val="990"/>
+              <a:buFont typeface="Arial"/>
+              <a:buNone/>
+            </a:pPr>
+            <a:r>
+              <a:rPr lang="en"/>
+              <a:t>Technologies</a:t>
+            </a:r>
+            <a:endParaRPr/>
+          </a:p>
+          <a:p>
+            <a:pPr marL="0" lvl="0" indent="0" algn="l" rtl="0">
+              <a:spcBef>
+                <a:spcPts val="0"/>
+              </a:spcBef>
+              <a:spcAft>
+                <a:spcPts val="0"/>
+              </a:spcAft>
+              <a:buClr>
+                <a:schemeClr val="dk2"/>
+              </a:buClr>
+              <a:buSzPts val="990"/>
+              <a:buFont typeface="Arial"/>
+              <a:buNone/>
+            </a:pPr>
+            <a:endParaRPr/>
+          </a:p>
+          <a:p>
+            <a:pPr marL="0" lvl="0" indent="0" algn="l" rtl="0">
+              <a:spcBef>
+                <a:spcPts val="0"/>
+              </a:spcBef>
+              <a:spcAft>
+                <a:spcPts val="0"/>
+              </a:spcAft>
+              <a:buNone/>
+            </a:pPr>
+            <a:endParaRPr/>
+          </a:p>
+        </p:txBody>
+      </p:sp>
+      <p:sp>
+        <p:nvSpPr>
+          <p:cNvPr id="106" name="Google Shape;106;p18"/>
+          <p:cNvSpPr txBox="1">
+            <a:spLocks noGrp="1"/>
+          </p:cNvSpPr>
+          <p:nvPr>
+            <p:ph type="subTitle" idx="1"/>
+          </p:nvPr>
+        </p:nvSpPr>
+        <p:spPr>
+          <a:xfrm>
+            <a:off x="2390275" y="1937602"/>
+            <a:ext cx="6331500" cy="2646848"/>
+          </a:xfrm>
+          <a:prstGeom prst="rect">
+            <a:avLst/>
+          </a:prstGeom>
+        </p:spPr>
+        <p:txBody>
+          <a:bodyPr spcFirstLastPara="1" wrap="square" lIns="91425" tIns="91425" rIns="91425" bIns="91425" anchor="b" anchorCtr="0">
+            <a:spAutoFit/>
+          </a:bodyPr>
+          <a:lstStyle/>
+          <a:p>
+            <a:pPr marL="457200" lvl="0" indent="-355600" algn="l" rtl="0">
+              <a:spcBef>
+                <a:spcPts val="0"/>
+              </a:spcBef>
+              <a:spcAft>
+                <a:spcPts val="0"/>
+              </a:spcAft>
+              <a:buSzPts val="2000"/>
+              <a:buFont typeface="Oswald"/>
+              <a:buChar char="●"/>
+            </a:pPr>
+            <a:r>
+              <a:rPr lang="en-IE" sz="2000" dirty="0"/>
+              <a:t>Microsoft Bot Framework: B</a:t>
+            </a:r>
+            <a:r>
+              <a:rPr lang="en-GB" sz="2000" dirty="0" err="1"/>
+              <a:t>uilding</a:t>
+            </a:r>
+            <a:r>
+              <a:rPr lang="en-GB" sz="2000" dirty="0"/>
+              <a:t> enterprise-grade conversational AI experiences</a:t>
+            </a:r>
+            <a:endParaRPr lang="en-IE" sz="2000" dirty="0"/>
+          </a:p>
+          <a:p>
+            <a:pPr marL="457200" lvl="0" indent="-355600" algn="l" rtl="0">
+              <a:spcBef>
+                <a:spcPts val="0"/>
+              </a:spcBef>
+              <a:spcAft>
+                <a:spcPts val="0"/>
+              </a:spcAft>
+              <a:buSzPts val="2000"/>
+              <a:buFont typeface="Oswald"/>
+              <a:buChar char="●"/>
+            </a:pPr>
+            <a:r>
+              <a:rPr lang="en-IE" sz="2000" dirty="0"/>
+              <a:t>Python: Handles Backend with supported AI libraries</a:t>
+            </a:r>
+          </a:p>
+          <a:p>
+            <a:pPr marL="457200" lvl="0" indent="-355600" algn="l" rtl="0">
+              <a:spcBef>
+                <a:spcPts val="0"/>
+              </a:spcBef>
+              <a:spcAft>
+                <a:spcPts val="0"/>
+              </a:spcAft>
+              <a:buSzPts val="2000"/>
+              <a:buFont typeface="Oswald"/>
+              <a:buChar char="●"/>
+            </a:pPr>
+            <a:r>
+              <a:rPr lang="en-IE" sz="2000" dirty="0"/>
+              <a:t>Azure Services: </a:t>
+            </a:r>
+            <a:r>
+              <a:rPr lang="en-GB" sz="2000" dirty="0"/>
+              <a:t>Translation and text analytics with </a:t>
+            </a:r>
+            <a:r>
+              <a:rPr lang="en-IE" sz="2000" dirty="0"/>
+              <a:t>Scalable, secure web hosting</a:t>
+            </a:r>
+          </a:p>
+          <a:p>
+            <a:pPr marL="457200" lvl="0" indent="-355600" algn="l" rtl="0">
+              <a:spcBef>
+                <a:spcPts val="0"/>
+              </a:spcBef>
+              <a:spcAft>
+                <a:spcPts val="0"/>
+              </a:spcAft>
+              <a:buSzPts val="2000"/>
+              <a:buFont typeface="Oswald"/>
+              <a:buChar char="●"/>
+            </a:pPr>
+            <a:r>
+              <a:rPr lang="en-IE" sz="2000" dirty="0"/>
+              <a:t>AI &amp; ML: </a:t>
+            </a:r>
+            <a:r>
+              <a:rPr lang="en-GB" sz="2000" dirty="0"/>
+              <a:t>Sentence Transformer models and cosine similarity</a:t>
+            </a:r>
+            <a:endParaRPr lang="en-IE" sz="2000" dirty="0"/>
+          </a:p>
+        </p:txBody>
+      </p:sp>
+      <p:pic>
+        <p:nvPicPr>
+          <p:cNvPr id="108" name="Google Shape;108;p18"/>
+          <p:cNvPicPr preferRelativeResize="0"/>
+          <p:nvPr/>
+        </p:nvPicPr>
+        <p:blipFill>
+          <a:blip r:embed="rId3">
+            <a:alphaModFix/>
+          </a:blip>
+          <a:stretch>
+            <a:fillRect/>
+          </a:stretch>
+        </p:blipFill>
+        <p:spPr>
+          <a:xfrm>
+            <a:off x="234902" y="512555"/>
+            <a:ext cx="2038350" cy="1742507"/>
+          </a:xfrm>
+          <a:prstGeom prst="rect">
+            <a:avLst/>
+          </a:prstGeom>
+          <a:noFill/>
+          <a:ln>
+            <a:noFill/>
+          </a:ln>
+        </p:spPr>
+      </p:pic>
+      <p:pic>
+        <p:nvPicPr>
+          <p:cNvPr id="3" name="Picture 2" descr="A blue logo with a triangle&#10;&#10;AI-generated content may be incorrect.">
+            <a:extLst>
+              <a:ext uri="{FF2B5EF4-FFF2-40B4-BE49-F238E27FC236}">
+                <a16:creationId xmlns:a16="http://schemas.microsoft.com/office/drawing/2014/main" id="{706FA8BF-996A-C798-BB23-44CA0A3BBC0F}"/>
+              </a:ext>
+            </a:extLst>
+          </p:cNvPr>
+          <p:cNvPicPr>
+            <a:picLocks noChangeAspect="1"/>
+          </p:cNvPicPr>
+          <p:nvPr/>
+        </p:nvPicPr>
+        <p:blipFill>
+          <a:blip r:embed="rId4"/>
+          <a:stretch>
+            <a:fillRect/>
+          </a:stretch>
+        </p:blipFill>
+        <p:spPr>
+          <a:xfrm>
+            <a:off x="422225" y="2571750"/>
+            <a:ext cx="1656520" cy="1882409"/>
+          </a:xfrm>
+          <a:prstGeom prst="rect">
+            <a:avLst/>
+          </a:prstGeom>
+        </p:spPr>
+      </p:pic>
+    </p:spTree>
+  </p:cSld>
+  <p:clrMapOvr>
+    <a:masterClrMapping/>
+  </p:clrMapOvr>
+</p:sld>
+</file>
+
+<file path=ppt/slides/slide4.xml><?xml version="1.0" encoding="utf-8"?>
+<p:sld xmlns:a="http://schemas.openxmlformats.org/drawingml/2006/main" xmlns:r="http://schemas.openxmlformats.org/officeDocument/2006/relationships" xmlns:p="http://schemas.openxmlformats.org/presentationml/2006/main">
+  <p:cSld>
+    <p:spTree>
+      <p:nvGrpSpPr>
+        <p:cNvPr id="1" name="Shape 112"/>
+        <p:cNvGrpSpPr/>
+        <p:nvPr/>
+      </p:nvGrpSpPr>
+      <p:grpSpPr>
+        <a:xfrm>
+          <a:off x="0" y="0"/>
+          <a:ext cx="0" cy="0"/>
+          <a:chOff x="0" y="0"/>
+          <a:chExt cx="0" cy="0"/>
+        </a:xfrm>
+      </p:grpSpPr>
+      <p:sp>
+        <p:nvSpPr>
+          <p:cNvPr id="113" name="Google Shape;113;p19"/>
+          <p:cNvSpPr txBox="1">
+            <a:spLocks noGrp="1"/>
+          </p:cNvSpPr>
+          <p:nvPr>
+            <p:ph type="ctrTitle"/>
+          </p:nvPr>
+        </p:nvSpPr>
+        <p:spPr>
+          <a:xfrm>
+            <a:off x="630382" y="630225"/>
+            <a:ext cx="8072843" cy="905400"/>
+          </a:xfrm>
+          <a:prstGeom prst="rect">
+            <a:avLst/>
+          </a:prstGeom>
+        </p:spPr>
+        <p:txBody>
+          <a:bodyPr spcFirstLastPara="1" wrap="square" lIns="91425" tIns="91425" rIns="91425" bIns="91425" anchor="t" anchorCtr="0">
+            <a:normAutofit fontScale="90000"/>
+          </a:bodyPr>
+          <a:lstStyle/>
+          <a:p>
+            <a:pPr marL="0" lvl="0" indent="0" algn="l" rtl="0">
+              <a:spcBef>
+                <a:spcPts val="0"/>
+              </a:spcBef>
+              <a:spcAft>
+                <a:spcPts val="0"/>
+              </a:spcAft>
+              <a:buClr>
+                <a:schemeClr val="dk2"/>
+              </a:buClr>
+              <a:buSzPts val="990"/>
+              <a:buFont typeface="Arial"/>
+              <a:buNone/>
+            </a:pPr>
+            <a:r>
+              <a:rPr lang="en-GB" dirty="0"/>
+              <a:t>Status of Implementation</a:t>
+            </a:r>
+            <a:endParaRPr dirty="0"/>
+          </a:p>
+          <a:p>
+            <a:pPr marL="0" lvl="0" indent="0" algn="l" rtl="0">
+              <a:spcBef>
+                <a:spcPts val="0"/>
+              </a:spcBef>
+              <a:spcAft>
+                <a:spcPts val="0"/>
+              </a:spcAft>
+              <a:buClr>
+                <a:schemeClr val="dk2"/>
+              </a:buClr>
+              <a:buSzPts val="990"/>
+              <a:buFont typeface="Arial"/>
+              <a:buNone/>
+            </a:pPr>
+            <a:endParaRPr dirty="0"/>
+          </a:p>
+          <a:p>
+            <a:pPr marL="0" lvl="0" indent="0" algn="l" rtl="0">
+              <a:spcBef>
+                <a:spcPts val="0"/>
+              </a:spcBef>
+              <a:spcAft>
+                <a:spcPts val="0"/>
+              </a:spcAft>
+              <a:buNone/>
+            </a:pPr>
+            <a:endParaRPr dirty="0"/>
+          </a:p>
+        </p:txBody>
+      </p:sp>
+      <p:sp>
+        <p:nvSpPr>
+          <p:cNvPr id="114" name="Google Shape;114;p19"/>
+          <p:cNvSpPr txBox="1">
+            <a:spLocks noGrp="1"/>
+          </p:cNvSpPr>
+          <p:nvPr>
+            <p:ph type="subTitle" idx="1"/>
+          </p:nvPr>
+        </p:nvSpPr>
+        <p:spPr>
+          <a:xfrm>
+            <a:off x="482339" y="1664676"/>
+            <a:ext cx="8072844" cy="2377544"/>
+          </a:xfrm>
+          <a:prstGeom prst="rect">
+            <a:avLst/>
+          </a:prstGeom>
+        </p:spPr>
+        <p:txBody>
+          <a:bodyPr spcFirstLastPara="1" wrap="square" lIns="91425" tIns="91425" rIns="91425" bIns="91425" anchor="b" anchorCtr="0">
+            <a:spAutoFit/>
+          </a:bodyPr>
+          <a:lstStyle/>
+          <a:p>
+            <a:pPr marL="342900" lvl="0" rtl="0">
+              <a:lnSpc>
+                <a:spcPct val="150000"/>
+              </a:lnSpc>
+              <a:spcBef>
+                <a:spcPts val="0"/>
+              </a:spcBef>
+              <a:spcAft>
+                <a:spcPts val="0"/>
+              </a:spcAft>
+              <a:buFont typeface="Arial" panose="020B0604020202020204" pitchFamily="34" charset="0"/>
+              <a:buChar char="•"/>
+            </a:pPr>
+            <a:r>
+              <a:rPr lang="en-GB" sz="1900" dirty="0">
+                <a:latin typeface="Oswald"/>
+                <a:ea typeface="Oswald"/>
+                <a:cs typeface="Oswald"/>
+                <a:sym typeface="Oswald"/>
+              </a:rPr>
+              <a:t>Dialog Flows: Conversation paths for scenarios are almost complete and integrated.</a:t>
+            </a:r>
+          </a:p>
+          <a:p>
+            <a:pPr marL="342900" lvl="0" rtl="0">
+              <a:lnSpc>
+                <a:spcPct val="150000"/>
+              </a:lnSpc>
+              <a:spcBef>
+                <a:spcPts val="0"/>
+              </a:spcBef>
+              <a:spcAft>
+                <a:spcPts val="0"/>
+              </a:spcAft>
+              <a:buFont typeface="Arial" panose="020B0604020202020204" pitchFamily="34" charset="0"/>
+              <a:buChar char="•"/>
+            </a:pPr>
+            <a:r>
+              <a:rPr lang="en-GB" sz="1900" dirty="0">
+                <a:latin typeface="Oswald"/>
+                <a:ea typeface="Oswald"/>
+                <a:cs typeface="Oswald"/>
+                <a:sym typeface="Oswald"/>
+              </a:rPr>
+              <a:t>Translation: Successfully integrated with Azure Translator for language conversion.</a:t>
+            </a:r>
+          </a:p>
+          <a:p>
+            <a:pPr marL="342900" lvl="0" rtl="0">
+              <a:lnSpc>
+                <a:spcPct val="150000"/>
+              </a:lnSpc>
+              <a:spcBef>
+                <a:spcPts val="0"/>
+              </a:spcBef>
+              <a:spcAft>
+                <a:spcPts val="0"/>
+              </a:spcAft>
+              <a:buFont typeface="Arial" panose="020B0604020202020204" pitchFamily="34" charset="0"/>
+              <a:buChar char="•"/>
+            </a:pPr>
+            <a:r>
+              <a:rPr lang="en-GB" sz="1900" dirty="0">
+                <a:latin typeface="Oswald"/>
+                <a:ea typeface="Oswald"/>
+                <a:cs typeface="Oswald"/>
+                <a:sym typeface="Oswald"/>
+              </a:rPr>
+              <a:t>Feedback: AI-driven evaluation using machine learning models is operational.</a:t>
+            </a:r>
+          </a:p>
+          <a:p>
+            <a:pPr marL="342900" lvl="0" rtl="0">
+              <a:lnSpc>
+                <a:spcPct val="150000"/>
+              </a:lnSpc>
+              <a:spcBef>
+                <a:spcPts val="0"/>
+              </a:spcBef>
+              <a:spcAft>
+                <a:spcPts val="0"/>
+              </a:spcAft>
+              <a:buFont typeface="Arial" panose="020B0604020202020204" pitchFamily="34" charset="0"/>
+              <a:buChar char="•"/>
+            </a:pPr>
+            <a:r>
+              <a:rPr lang="en-GB" sz="1900" dirty="0">
+                <a:latin typeface="Oswald"/>
+                <a:ea typeface="Oswald"/>
+                <a:cs typeface="Oswald"/>
+                <a:sym typeface="Oswald"/>
+              </a:rPr>
+              <a:t>User State Management: Tracks language, proficiency, and scores effectively.</a:t>
+            </a:r>
+          </a:p>
+          <a:p>
+            <a:pPr marL="342900" lvl="0" rtl="0">
+              <a:lnSpc>
+                <a:spcPct val="150000"/>
+              </a:lnSpc>
+              <a:spcBef>
+                <a:spcPts val="0"/>
+              </a:spcBef>
+              <a:spcAft>
+                <a:spcPts val="0"/>
+              </a:spcAft>
+              <a:buFont typeface="Arial" panose="020B0604020202020204" pitchFamily="34" charset="0"/>
+              <a:buChar char="•"/>
+            </a:pPr>
+            <a:r>
+              <a:rPr lang="en-GB" sz="1900" dirty="0">
+                <a:latin typeface="Oswald"/>
+                <a:ea typeface="Oswald"/>
+                <a:cs typeface="Oswald"/>
+                <a:sym typeface="Oswald"/>
+              </a:rPr>
+              <a:t>Deployment: Web hosting via aiohttp is in progress.</a:t>
+            </a:r>
+          </a:p>
+        </p:txBody>
+      </p:sp>
+    </p:spTree>
+  </p:cSld>
+  <p:clrMapOvr>
+    <a:masterClrMapping/>
+  </p:clrMapOvr>
+</p:sld>
+</file>
+
+<file path=ppt/slides/slide5.xml><?xml version="1.0" encoding="utf-8"?>
+<p:sld xmlns:a="http://schemas.openxmlformats.org/drawingml/2006/main" xmlns:r="http://schemas.openxmlformats.org/officeDocument/2006/relationships" xmlns:p="http://schemas.openxmlformats.org/presentationml/2006/main">
+  <p:cSld>
     <p:spTree>
       <p:nvGrpSpPr>
         <p:cNvPr id="1" name="Shape 131"/>
@@ -8323,25 +8339,129 @@
 </p:sld>
 </file>
 
-<file path=ppt/slides/slide11.xml><?xml version="1.0" encoding="utf-8"?>
+<file path=ppt/slides/slide6.xml><?xml version="1.0" encoding="utf-8"?>
 <p:sld xmlns:a="http://schemas.openxmlformats.org/drawingml/2006/main" xmlns:r="http://schemas.openxmlformats.org/officeDocument/2006/relationships" xmlns:p="http://schemas.openxmlformats.org/presentationml/2006/main">
   <p:cSld>
-    <p:bg>
-      <p:bgPr>
-        <a:gradFill>
-          <a:gsLst>
-            <a:gs pos="0">
-              <a:schemeClr val="accent3"/>
-            </a:gs>
-            <a:gs pos="100000">
-              <a:schemeClr val="dk1"/>
-            </a:gs>
-          </a:gsLst>
-          <a:lin ang="5400012" scaled="0"/>
-        </a:gradFill>
-        <a:effectLst/>
-      </p:bgPr>
-    </p:bg>
+    <p:spTree>
+      <p:nvGrpSpPr>
+        <p:cNvPr id="1" name=""/>
+        <p:cNvGrpSpPr/>
+        <p:nvPr/>
+      </p:nvGrpSpPr>
+      <p:grpSpPr>
+        <a:xfrm>
+          <a:off x="0" y="0"/>
+          <a:ext cx="0" cy="0"/>
+          <a:chOff x="0" y="0"/>
+          <a:chExt cx="0" cy="0"/>
+        </a:xfrm>
+      </p:grpSpPr>
+      <p:pic>
+        <p:nvPicPr>
+          <p:cNvPr id="4" name="Picture 3">
+            <a:extLst>
+              <a:ext uri="{FF2B5EF4-FFF2-40B4-BE49-F238E27FC236}">
+                <a16:creationId xmlns:a16="http://schemas.microsoft.com/office/drawing/2014/main" id="{B1C15978-C315-8295-AA9B-11CD3EAD7C6A}"/>
+              </a:ext>
+            </a:extLst>
+          </p:cNvPr>
+          <p:cNvPicPr>
+            <a:picLocks noChangeAspect="1"/>
+          </p:cNvPicPr>
+          <p:nvPr/>
+        </p:nvPicPr>
+        <p:blipFill>
+          <a:blip r:embed="rId2"/>
+          <a:stretch>
+            <a:fillRect/>
+          </a:stretch>
+        </p:blipFill>
+        <p:spPr>
+          <a:xfrm>
+            <a:off x="236394" y="787978"/>
+            <a:ext cx="2686050" cy="3238500"/>
+          </a:xfrm>
+          <a:prstGeom prst="rect">
+            <a:avLst/>
+          </a:prstGeom>
+        </p:spPr>
+      </p:pic>
+      <p:pic>
+        <p:nvPicPr>
+          <p:cNvPr id="6" name="Picture 5">
+            <a:extLst>
+              <a:ext uri="{FF2B5EF4-FFF2-40B4-BE49-F238E27FC236}">
+                <a16:creationId xmlns:a16="http://schemas.microsoft.com/office/drawing/2014/main" id="{90E61EBE-576F-85EE-48AA-3BE2FA553621}"/>
+              </a:ext>
+            </a:extLst>
+          </p:cNvPr>
+          <p:cNvPicPr>
+            <a:picLocks noChangeAspect="1"/>
+          </p:cNvPicPr>
+          <p:nvPr/>
+        </p:nvPicPr>
+        <p:blipFill>
+          <a:blip r:embed="rId3"/>
+          <a:stretch>
+            <a:fillRect/>
+          </a:stretch>
+        </p:blipFill>
+        <p:spPr>
+          <a:xfrm>
+            <a:off x="3032197" y="783215"/>
+            <a:ext cx="2581275" cy="3238500"/>
+          </a:xfrm>
+          <a:prstGeom prst="rect">
+            <a:avLst/>
+          </a:prstGeom>
+        </p:spPr>
+      </p:pic>
+      <p:pic>
+        <p:nvPicPr>
+          <p:cNvPr id="8" name="Picture 7">
+            <a:extLst>
+              <a:ext uri="{FF2B5EF4-FFF2-40B4-BE49-F238E27FC236}">
+                <a16:creationId xmlns:a16="http://schemas.microsoft.com/office/drawing/2014/main" id="{F8C458CB-AF74-2790-4BBA-4C9269B19A48}"/>
+              </a:ext>
+            </a:extLst>
+          </p:cNvPr>
+          <p:cNvPicPr>
+            <a:picLocks noChangeAspect="1"/>
+          </p:cNvPicPr>
+          <p:nvPr/>
+        </p:nvPicPr>
+        <p:blipFill>
+          <a:blip r:embed="rId4"/>
+          <a:stretch>
+            <a:fillRect/>
+          </a:stretch>
+        </p:blipFill>
+        <p:spPr>
+          <a:xfrm>
+            <a:off x="5723226" y="778453"/>
+            <a:ext cx="2657475" cy="3248025"/>
+          </a:xfrm>
+          <a:prstGeom prst="rect">
+            <a:avLst/>
+          </a:prstGeom>
+        </p:spPr>
+      </p:pic>
+    </p:spTree>
+    <p:extLst>
+      <p:ext uri="{BB962C8B-B14F-4D97-AF65-F5344CB8AC3E}">
+        <p14:creationId xmlns:p14="http://schemas.microsoft.com/office/powerpoint/2010/main" val="86764485"/>
+      </p:ext>
+    </p:extLst>
+  </p:cSld>
+  <p:clrMapOvr>
+    <a:masterClrMapping/>
+  </p:clrMapOvr>
+</p:sld>
+</file>
+
+<file path=ppt/slides/slide7.xml><?xml version="1.0" encoding="utf-8"?>
+<p:sld xmlns:a="http://schemas.openxmlformats.org/drawingml/2006/main" xmlns:r="http://schemas.openxmlformats.org/officeDocument/2006/relationships" xmlns:p="http://schemas.openxmlformats.org/presentationml/2006/main">
+  <p:cSld>
     <p:spTree>
       <p:nvGrpSpPr>
         <p:cNvPr id="1" name="Shape 136"/>
@@ -8571,297 +8691,9 @@
 </p:sld>
 </file>
 
-<file path=ppt/slides/slide12.xml><?xml version="1.0" encoding="utf-8"?>
+<file path=ppt/slides/slide8.xml><?xml version="1.0" encoding="utf-8"?>
 <p:sld xmlns:a="http://schemas.openxmlformats.org/drawingml/2006/main" xmlns:r="http://schemas.openxmlformats.org/officeDocument/2006/relationships" xmlns:p="http://schemas.openxmlformats.org/presentationml/2006/main">
   <p:cSld>
-    <p:bg>
-      <p:bgPr>
-        <a:gradFill>
-          <a:gsLst>
-            <a:gs pos="0">
-              <a:schemeClr val="accent3"/>
-            </a:gs>
-            <a:gs pos="100000">
-              <a:schemeClr val="dk1"/>
-            </a:gs>
-          </a:gsLst>
-          <a:lin ang="5400012" scaled="0"/>
-        </a:gradFill>
-        <a:effectLst/>
-      </p:bgPr>
-    </p:bg>
-    <p:spTree>
-      <p:nvGrpSpPr>
-        <p:cNvPr id="1" name="Shape 143"/>
-        <p:cNvGrpSpPr/>
-        <p:nvPr/>
-      </p:nvGrpSpPr>
-      <p:grpSpPr>
-        <a:xfrm>
-          <a:off x="0" y="0"/>
-          <a:ext cx="0" cy="0"/>
-          <a:chOff x="0" y="0"/>
-          <a:chExt cx="0" cy="0"/>
-        </a:xfrm>
-      </p:grpSpPr>
-      <p:sp>
-        <p:nvSpPr>
-          <p:cNvPr id="144" name="Google Shape;144;p24"/>
-          <p:cNvSpPr txBox="1">
-            <a:spLocks noGrp="1"/>
-          </p:cNvSpPr>
-          <p:nvPr>
-            <p:ph type="ctrTitle"/>
-          </p:nvPr>
-        </p:nvSpPr>
-        <p:spPr>
-          <a:xfrm>
-            <a:off x="2371725" y="630225"/>
-            <a:ext cx="6331500" cy="905400"/>
-          </a:xfrm>
-          <a:prstGeom prst="rect">
-            <a:avLst/>
-          </a:prstGeom>
-        </p:spPr>
-        <p:txBody>
-          <a:bodyPr spcFirstLastPara="1" wrap="square" lIns="91425" tIns="91425" rIns="91425" bIns="91425" anchor="t" anchorCtr="0">
-            <a:normAutofit fontScale="90000"/>
-          </a:bodyPr>
-          <a:lstStyle/>
-          <a:p>
-            <a:pPr marL="0" lvl="0" indent="0" algn="l" rtl="0">
-              <a:spcBef>
-                <a:spcPts val="0"/>
-              </a:spcBef>
-              <a:spcAft>
-                <a:spcPts val="0"/>
-              </a:spcAft>
-              <a:buClr>
-                <a:schemeClr val="dk2"/>
-              </a:buClr>
-              <a:buSzPts val="990"/>
-              <a:buFont typeface="Arial"/>
-              <a:buNone/>
-            </a:pPr>
-            <a:r>
-              <a:rPr lang="en"/>
-              <a:t>References</a:t>
-            </a:r>
-            <a:endParaRPr/>
-          </a:p>
-          <a:p>
-            <a:pPr marL="0" lvl="0" indent="0" algn="l" rtl="0">
-              <a:spcBef>
-                <a:spcPts val="0"/>
-              </a:spcBef>
-              <a:spcAft>
-                <a:spcPts val="0"/>
-              </a:spcAft>
-              <a:buClr>
-                <a:schemeClr val="dk2"/>
-              </a:buClr>
-              <a:buSzPts val="990"/>
-              <a:buFont typeface="Arial"/>
-              <a:buNone/>
-            </a:pPr>
-            <a:endParaRPr/>
-          </a:p>
-          <a:p>
-            <a:pPr marL="0" lvl="0" indent="0" algn="l" rtl="0">
-              <a:spcBef>
-                <a:spcPts val="0"/>
-              </a:spcBef>
-              <a:spcAft>
-                <a:spcPts val="0"/>
-              </a:spcAft>
-              <a:buClr>
-                <a:schemeClr val="dk2"/>
-              </a:buClr>
-              <a:buSzPts val="990"/>
-              <a:buFont typeface="Arial"/>
-              <a:buNone/>
-            </a:pPr>
-            <a:endParaRPr/>
-          </a:p>
-          <a:p>
-            <a:pPr marL="0" lvl="0" indent="0" algn="l" rtl="0">
-              <a:spcBef>
-                <a:spcPts val="0"/>
-              </a:spcBef>
-              <a:spcAft>
-                <a:spcPts val="0"/>
-              </a:spcAft>
-              <a:buNone/>
-            </a:pPr>
-            <a:endParaRPr/>
-          </a:p>
-        </p:txBody>
-      </p:sp>
-      <p:sp>
-        <p:nvSpPr>
-          <p:cNvPr id="145" name="Google Shape;145;p24"/>
-          <p:cNvSpPr txBox="1">
-            <a:spLocks noGrp="1"/>
-          </p:cNvSpPr>
-          <p:nvPr>
-            <p:ph type="subTitle" idx="1"/>
-          </p:nvPr>
-        </p:nvSpPr>
-        <p:spPr>
-          <a:xfrm>
-            <a:off x="497250" y="1717650"/>
-            <a:ext cx="8149500" cy="1908600"/>
-          </a:xfrm>
-          <a:prstGeom prst="rect">
-            <a:avLst/>
-          </a:prstGeom>
-        </p:spPr>
-        <p:txBody>
-          <a:bodyPr spcFirstLastPara="1" wrap="square" lIns="91425" tIns="91425" rIns="91425" bIns="91425" anchor="b" anchorCtr="0">
-            <a:spAutoFit/>
-          </a:bodyPr>
-          <a:lstStyle/>
-          <a:p>
-            <a:pPr marL="0" lvl="0" indent="0" algn="l" rtl="0">
-              <a:spcBef>
-                <a:spcPts val="0"/>
-              </a:spcBef>
-              <a:spcAft>
-                <a:spcPts val="0"/>
-              </a:spcAft>
-              <a:buNone/>
-            </a:pPr>
-            <a:r>
-              <a:rPr lang="en" sz="1600">
-                <a:latin typeface="Oswald"/>
-                <a:ea typeface="Oswald"/>
-                <a:cs typeface="Oswald"/>
-                <a:sym typeface="Oswald"/>
-              </a:rPr>
-              <a:t>[1] Preply. (2021) Multilingual UK adults. Available at: https://preply.com/wp-content/uploads/2021/11/Multilingual-UK-adults.png (Accessed: 17 October 2024).</a:t>
-            </a:r>
-            <a:endParaRPr sz="1600">
-              <a:latin typeface="Oswald"/>
-              <a:ea typeface="Oswald"/>
-              <a:cs typeface="Oswald"/>
-              <a:sym typeface="Oswald"/>
-            </a:endParaRPr>
-          </a:p>
-          <a:p>
-            <a:pPr marL="0" lvl="0" indent="0" algn="l" rtl="0">
-              <a:spcBef>
-                <a:spcPts val="0"/>
-              </a:spcBef>
-              <a:spcAft>
-                <a:spcPts val="0"/>
-              </a:spcAft>
-              <a:buNone/>
-            </a:pPr>
-            <a:r>
-              <a:rPr lang="en" sz="1600">
-                <a:latin typeface="Oswald"/>
-                <a:ea typeface="Oswald"/>
-                <a:cs typeface="Oswald"/>
-                <a:sym typeface="Oswald"/>
-              </a:rPr>
-              <a:t>[2] Preply 2024, Americans’ Foreign Language Learning Survey, Preply. Available at: https://preply.com/en/blog/americans-foreign-language-survey/ (Accessed: 17 October 2024).    </a:t>
-            </a:r>
-            <a:endParaRPr sz="1600">
-              <a:latin typeface="Oswald"/>
-              <a:ea typeface="Oswald"/>
-              <a:cs typeface="Oswald"/>
-              <a:sym typeface="Oswald"/>
-            </a:endParaRPr>
-          </a:p>
-          <a:p>
-            <a:pPr marL="0" lvl="0" indent="0" algn="l" rtl="0">
-              <a:spcBef>
-                <a:spcPts val="0"/>
-              </a:spcBef>
-              <a:spcAft>
-                <a:spcPts val="0"/>
-              </a:spcAft>
-              <a:buNone/>
-            </a:pPr>
-            <a:r>
-              <a:rPr lang="en" sz="1600">
-                <a:latin typeface="Oswald"/>
-                <a:ea typeface="Oswald"/>
-                <a:cs typeface="Oswald"/>
-                <a:sym typeface="Oswald"/>
-              </a:rPr>
-              <a:t>                                  	 </a:t>
-            </a:r>
-            <a:endParaRPr sz="1600">
-              <a:latin typeface="Oswald"/>
-              <a:ea typeface="Oswald"/>
-              <a:cs typeface="Oswald"/>
-              <a:sym typeface="Oswald"/>
-            </a:endParaRPr>
-          </a:p>
-          <a:p>
-            <a:pPr marL="0" lvl="0" indent="0" algn="l" rtl="0">
-              <a:spcBef>
-                <a:spcPts val="0"/>
-              </a:spcBef>
-              <a:spcAft>
-                <a:spcPts val="0"/>
-              </a:spcAft>
-              <a:buNone/>
-            </a:pPr>
-            <a:endParaRPr sz="1600">
-              <a:latin typeface="Oswald"/>
-              <a:ea typeface="Oswald"/>
-              <a:cs typeface="Oswald"/>
-              <a:sym typeface="Oswald"/>
-            </a:endParaRPr>
-          </a:p>
-          <a:p>
-            <a:pPr marL="0" lvl="0" indent="0" algn="l" rtl="0">
-              <a:spcBef>
-                <a:spcPts val="0"/>
-              </a:spcBef>
-              <a:spcAft>
-                <a:spcPts val="0"/>
-              </a:spcAft>
-              <a:buNone/>
-            </a:pPr>
-            <a:endParaRPr sz="1600">
-              <a:latin typeface="Oswald"/>
-              <a:ea typeface="Oswald"/>
-              <a:cs typeface="Oswald"/>
-              <a:sym typeface="Oswald"/>
-            </a:endParaRPr>
-          </a:p>
-        </p:txBody>
-      </p:sp>
-    </p:spTree>
-  </p:cSld>
-  <p:clrMapOvr>
-    <a:masterClrMapping/>
-  </p:clrMapOvr>
-</p:sld>
-</file>
-
-<file path=ppt/slides/slide13.xml><?xml version="1.0" encoding="utf-8"?>
-<p:sld xmlns:a="http://schemas.openxmlformats.org/drawingml/2006/main" xmlns:r="http://schemas.openxmlformats.org/officeDocument/2006/relationships" xmlns:p="http://schemas.openxmlformats.org/presentationml/2006/main">
-  <p:cSld>
-    <p:bg>
-      <p:bgPr>
-        <a:gradFill>
-          <a:gsLst>
-            <a:gs pos="0">
-              <a:schemeClr val="accent3"/>
-            </a:gs>
-            <a:gs pos="100000">
-              <a:schemeClr val="dk1"/>
-            </a:gs>
-          </a:gsLst>
-          <a:lin ang="5400012" scaled="0"/>
-        </a:gradFill>
-        <a:effectLst/>
-      </p:bgPr>
-    </p:bg>
     <p:spTree>
       <p:nvGrpSpPr>
         <p:cNvPr id="1" name="Shape 149"/>
@@ -8966,2260 +8798,6 @@
               <a:buNone/>
             </a:pPr>
             <a:endParaRPr/>
-          </a:p>
-        </p:txBody>
-      </p:sp>
-    </p:spTree>
-  </p:cSld>
-  <p:clrMapOvr>
-    <a:masterClrMapping/>
-  </p:clrMapOvr>
-</p:sld>
-</file>
-
-<file path=ppt/slides/slide2.xml><?xml version="1.0" encoding="utf-8"?>
-<p:sld xmlns:a="http://schemas.openxmlformats.org/drawingml/2006/main" xmlns:r="http://schemas.openxmlformats.org/officeDocument/2006/relationships" xmlns:p="http://schemas.openxmlformats.org/presentationml/2006/main">
-  <p:cSld>
-    <p:bg>
-      <p:bgPr>
-        <a:gradFill>
-          <a:gsLst>
-            <a:gs pos="0">
-              <a:schemeClr val="accent3"/>
-            </a:gs>
-            <a:gs pos="100000">
-              <a:schemeClr val="dk1"/>
-            </a:gs>
-          </a:gsLst>
-          <a:lin ang="5400012" scaled="0"/>
-        </a:gradFill>
-        <a:effectLst/>
-      </p:bgPr>
-    </p:bg>
-    <p:spTree>
-      <p:nvGrpSpPr>
-        <p:cNvPr id="1" name="Shape 77"/>
-        <p:cNvGrpSpPr/>
-        <p:nvPr/>
-      </p:nvGrpSpPr>
-      <p:grpSpPr>
-        <a:xfrm>
-          <a:off x="0" y="0"/>
-          <a:ext cx="0" cy="0"/>
-          <a:chOff x="0" y="0"/>
-          <a:chExt cx="0" cy="0"/>
-        </a:xfrm>
-      </p:grpSpPr>
-      <p:sp>
-        <p:nvSpPr>
-          <p:cNvPr id="78" name="Google Shape;78;p14"/>
-          <p:cNvSpPr txBox="1">
-            <a:spLocks noGrp="1"/>
-          </p:cNvSpPr>
-          <p:nvPr>
-            <p:ph type="ctrTitle"/>
-          </p:nvPr>
-        </p:nvSpPr>
-        <p:spPr>
-          <a:xfrm>
-            <a:off x="2371725" y="630225"/>
-            <a:ext cx="6331500" cy="913200"/>
-          </a:xfrm>
-          <a:prstGeom prst="rect">
-            <a:avLst/>
-          </a:prstGeom>
-        </p:spPr>
-        <p:txBody>
-          <a:bodyPr spcFirstLastPara="1" wrap="square" lIns="91425" tIns="91425" rIns="91425" bIns="91425" anchor="t" anchorCtr="0">
-            <a:normAutofit fontScale="90000"/>
-          </a:bodyPr>
-          <a:lstStyle/>
-          <a:p>
-            <a:pPr marL="0" lvl="0" indent="0" algn="l" rtl="0">
-              <a:spcBef>
-                <a:spcPts val="0"/>
-              </a:spcBef>
-              <a:spcAft>
-                <a:spcPts val="0"/>
-              </a:spcAft>
-              <a:buNone/>
-            </a:pPr>
-            <a:r>
-              <a:rPr lang="en"/>
-              <a:t>Introduction</a:t>
-            </a:r>
-            <a:endParaRPr/>
-          </a:p>
-        </p:txBody>
-      </p:sp>
-      <p:sp>
-        <p:nvSpPr>
-          <p:cNvPr id="79" name="Google Shape;79;p14"/>
-          <p:cNvSpPr txBox="1">
-            <a:spLocks noGrp="1"/>
-          </p:cNvSpPr>
-          <p:nvPr>
-            <p:ph type="subTitle" idx="1"/>
-          </p:nvPr>
-        </p:nvSpPr>
-        <p:spPr>
-          <a:xfrm>
-            <a:off x="2390275" y="1629150"/>
-            <a:ext cx="6331500" cy="2031900"/>
-          </a:xfrm>
-          <a:prstGeom prst="rect">
-            <a:avLst/>
-          </a:prstGeom>
-        </p:spPr>
-        <p:txBody>
-          <a:bodyPr spcFirstLastPara="1" wrap="square" lIns="91425" tIns="91425" rIns="91425" bIns="91425" anchor="b" anchorCtr="0">
-            <a:spAutoFit/>
-          </a:bodyPr>
-          <a:lstStyle/>
-          <a:p>
-            <a:pPr marL="457200" lvl="0" indent="-355600" algn="l" rtl="0">
-              <a:spcBef>
-                <a:spcPts val="0"/>
-              </a:spcBef>
-              <a:spcAft>
-                <a:spcPts val="0"/>
-              </a:spcAft>
-              <a:buSzPts val="2000"/>
-              <a:buFont typeface="Oswald"/>
-              <a:buChar char="●"/>
-            </a:pPr>
-            <a:r>
-              <a:rPr lang="en" sz="2000">
-                <a:latin typeface="Oswald"/>
-                <a:ea typeface="Oswald"/>
-                <a:cs typeface="Oswald"/>
-                <a:sym typeface="Oswald"/>
-              </a:rPr>
-              <a:t>LingoLizard is a tool designed to help people learn languages using real time lessons and conversations. </a:t>
-            </a:r>
-            <a:endParaRPr sz="2000">
-              <a:latin typeface="Oswald"/>
-              <a:ea typeface="Oswald"/>
-              <a:cs typeface="Oswald"/>
-              <a:sym typeface="Oswald"/>
-            </a:endParaRPr>
-          </a:p>
-          <a:p>
-            <a:pPr marL="457200" lvl="0" indent="-355600" algn="l" rtl="0">
-              <a:spcBef>
-                <a:spcPts val="0"/>
-              </a:spcBef>
-              <a:spcAft>
-                <a:spcPts val="0"/>
-              </a:spcAft>
-              <a:buSzPts val="2000"/>
-              <a:buFont typeface="Oswald"/>
-              <a:buChar char="●"/>
-            </a:pPr>
-            <a:r>
-              <a:rPr lang="en" sz="2000">
-                <a:latin typeface="Oswald"/>
-                <a:ea typeface="Oswald"/>
-                <a:cs typeface="Oswald"/>
-                <a:sym typeface="Oswald"/>
-              </a:rPr>
-              <a:t>It will do this using AI to simulate interactions in different languages.</a:t>
-            </a:r>
-            <a:endParaRPr sz="2000">
-              <a:latin typeface="Oswald"/>
-              <a:ea typeface="Oswald"/>
-              <a:cs typeface="Oswald"/>
-              <a:sym typeface="Oswald"/>
-            </a:endParaRPr>
-          </a:p>
-          <a:p>
-            <a:pPr marL="457200" lvl="0" indent="-355600" algn="l" rtl="0">
-              <a:spcBef>
-                <a:spcPts val="0"/>
-              </a:spcBef>
-              <a:spcAft>
-                <a:spcPts val="0"/>
-              </a:spcAft>
-              <a:buSzPts val="2000"/>
-              <a:buFont typeface="Oswald"/>
-              <a:buChar char="●"/>
-            </a:pPr>
-            <a:r>
-              <a:rPr lang="en" sz="2000">
-                <a:latin typeface="Oswald"/>
-                <a:ea typeface="Oswald"/>
-                <a:cs typeface="Oswald"/>
-                <a:sym typeface="Oswald"/>
-              </a:rPr>
-              <a:t>It will be able to give real time feedback and corrections to spelling and grammar.</a:t>
-            </a:r>
-            <a:endParaRPr sz="2000">
-              <a:latin typeface="Oswald"/>
-              <a:ea typeface="Oswald"/>
-              <a:cs typeface="Oswald"/>
-              <a:sym typeface="Oswald"/>
-            </a:endParaRPr>
-          </a:p>
-        </p:txBody>
-      </p:sp>
-    </p:spTree>
-  </p:cSld>
-  <p:clrMapOvr>
-    <a:masterClrMapping/>
-  </p:clrMapOvr>
-</p:sld>
-</file>
-
-<file path=ppt/slides/slide3.xml><?xml version="1.0" encoding="utf-8"?>
-<p:sld xmlns:a="http://schemas.openxmlformats.org/drawingml/2006/main" xmlns:r="http://schemas.openxmlformats.org/officeDocument/2006/relationships" xmlns:p="http://schemas.openxmlformats.org/presentationml/2006/main">
-  <p:cSld>
-    <p:bg>
-      <p:bgPr>
-        <a:gradFill>
-          <a:gsLst>
-            <a:gs pos="0">
-              <a:schemeClr val="accent3"/>
-            </a:gs>
-            <a:gs pos="100000">
-              <a:schemeClr val="dk1"/>
-            </a:gs>
-          </a:gsLst>
-          <a:lin ang="5400012" scaled="0"/>
-        </a:gradFill>
-        <a:effectLst/>
-      </p:bgPr>
-    </p:bg>
-    <p:spTree>
-      <p:nvGrpSpPr>
-        <p:cNvPr id="1" name="Shape 83"/>
-        <p:cNvGrpSpPr/>
-        <p:nvPr/>
-      </p:nvGrpSpPr>
-      <p:grpSpPr>
-        <a:xfrm>
-          <a:off x="0" y="0"/>
-          <a:ext cx="0" cy="0"/>
-          <a:chOff x="0" y="0"/>
-          <a:chExt cx="0" cy="0"/>
-        </a:xfrm>
-      </p:grpSpPr>
-      <p:sp>
-        <p:nvSpPr>
-          <p:cNvPr id="84" name="Google Shape;84;p15"/>
-          <p:cNvSpPr txBox="1">
-            <a:spLocks noGrp="1"/>
-          </p:cNvSpPr>
-          <p:nvPr>
-            <p:ph type="ctrTitle"/>
-          </p:nvPr>
-        </p:nvSpPr>
-        <p:spPr>
-          <a:xfrm>
-            <a:off x="1043225" y="572575"/>
-            <a:ext cx="6331500" cy="913200"/>
-          </a:xfrm>
-          <a:prstGeom prst="rect">
-            <a:avLst/>
-          </a:prstGeom>
-        </p:spPr>
-        <p:txBody>
-          <a:bodyPr spcFirstLastPara="1" wrap="square" lIns="91425" tIns="91425" rIns="91425" bIns="91425" anchor="t" anchorCtr="0">
-            <a:normAutofit fontScale="90000"/>
-          </a:bodyPr>
-          <a:lstStyle/>
-          <a:p>
-            <a:pPr marL="0" lvl="0" indent="0" algn="l" rtl="0">
-              <a:spcBef>
-                <a:spcPts val="0"/>
-              </a:spcBef>
-              <a:spcAft>
-                <a:spcPts val="0"/>
-              </a:spcAft>
-              <a:buNone/>
-            </a:pPr>
-            <a:r>
-              <a:rPr lang="en"/>
-              <a:t>Target Audience</a:t>
-            </a:r>
-            <a:endParaRPr/>
-          </a:p>
-        </p:txBody>
-      </p:sp>
-      <p:sp>
-        <p:nvSpPr>
-          <p:cNvPr id="85" name="Google Shape;85;p15"/>
-          <p:cNvSpPr txBox="1">
-            <a:spLocks noGrp="1"/>
-          </p:cNvSpPr>
-          <p:nvPr>
-            <p:ph type="subTitle" idx="1"/>
-          </p:nvPr>
-        </p:nvSpPr>
-        <p:spPr>
-          <a:xfrm>
-            <a:off x="1043225" y="1629150"/>
-            <a:ext cx="4117500" cy="1723800"/>
-          </a:xfrm>
-          <a:prstGeom prst="rect">
-            <a:avLst/>
-          </a:prstGeom>
-        </p:spPr>
-        <p:txBody>
-          <a:bodyPr spcFirstLastPara="1" wrap="square" lIns="91425" tIns="91425" rIns="91425" bIns="91425" anchor="b" anchorCtr="0">
-            <a:spAutoFit/>
-          </a:bodyPr>
-          <a:lstStyle/>
-          <a:p>
-            <a:pPr marL="457200" lvl="0" indent="-355600" algn="l" rtl="0">
-              <a:spcBef>
-                <a:spcPts val="0"/>
-              </a:spcBef>
-              <a:spcAft>
-                <a:spcPts val="0"/>
-              </a:spcAft>
-              <a:buSzPts val="2000"/>
-              <a:buFont typeface="Oswald"/>
-              <a:buChar char="●"/>
-            </a:pPr>
-            <a:r>
-              <a:rPr lang="en" sz="2000">
-                <a:latin typeface="Oswald"/>
-                <a:ea typeface="Oswald"/>
-                <a:cs typeface="Oswald"/>
-                <a:sym typeface="Oswald"/>
-              </a:rPr>
-              <a:t>Language Learners</a:t>
-            </a:r>
-            <a:br>
-              <a:rPr lang="en" sz="2000">
-                <a:latin typeface="Oswald"/>
-                <a:ea typeface="Oswald"/>
-                <a:cs typeface="Oswald"/>
-                <a:sym typeface="Oswald"/>
-              </a:rPr>
-            </a:br>
-            <a:endParaRPr sz="2000">
-              <a:latin typeface="Oswald"/>
-              <a:ea typeface="Oswald"/>
-              <a:cs typeface="Oswald"/>
-              <a:sym typeface="Oswald"/>
-            </a:endParaRPr>
-          </a:p>
-          <a:p>
-            <a:pPr marL="457200" lvl="0" indent="-355600" algn="l" rtl="0">
-              <a:spcBef>
-                <a:spcPts val="0"/>
-              </a:spcBef>
-              <a:spcAft>
-                <a:spcPts val="0"/>
-              </a:spcAft>
-              <a:buSzPts val="2000"/>
-              <a:buFont typeface="Oswald"/>
-              <a:buChar char="●"/>
-            </a:pPr>
-            <a:r>
-              <a:rPr lang="en" sz="2000">
-                <a:latin typeface="Oswald"/>
-                <a:ea typeface="Oswald"/>
-                <a:cs typeface="Oswald"/>
-                <a:sym typeface="Oswald"/>
-              </a:rPr>
-              <a:t>Teachers and students</a:t>
-            </a:r>
-            <a:br>
-              <a:rPr lang="en" sz="2000">
-                <a:latin typeface="Oswald"/>
-                <a:ea typeface="Oswald"/>
-                <a:cs typeface="Oswald"/>
-                <a:sym typeface="Oswald"/>
-              </a:rPr>
-            </a:br>
-            <a:endParaRPr sz="2000">
-              <a:latin typeface="Oswald"/>
-              <a:ea typeface="Oswald"/>
-              <a:cs typeface="Oswald"/>
-              <a:sym typeface="Oswald"/>
-            </a:endParaRPr>
-          </a:p>
-          <a:p>
-            <a:pPr marL="457200" lvl="0" indent="-355600" algn="l" rtl="0">
-              <a:spcBef>
-                <a:spcPts val="0"/>
-              </a:spcBef>
-              <a:spcAft>
-                <a:spcPts val="0"/>
-              </a:spcAft>
-              <a:buSzPts val="2000"/>
-              <a:buFont typeface="Oswald"/>
-              <a:buChar char="●"/>
-            </a:pPr>
-            <a:r>
-              <a:rPr lang="en" sz="2000">
-                <a:latin typeface="Oswald"/>
-                <a:ea typeface="Oswald"/>
-                <a:cs typeface="Oswald"/>
-                <a:sym typeface="Oswald"/>
-              </a:rPr>
-              <a:t>Travellers and expats</a:t>
-            </a:r>
-            <a:endParaRPr sz="2000">
-              <a:latin typeface="Oswald"/>
-              <a:ea typeface="Oswald"/>
-              <a:cs typeface="Oswald"/>
-              <a:sym typeface="Oswald"/>
-            </a:endParaRPr>
-          </a:p>
-        </p:txBody>
-      </p:sp>
-      <p:pic>
-        <p:nvPicPr>
-          <p:cNvPr id="86" name="Google Shape;86;p15"/>
-          <p:cNvPicPr preferRelativeResize="0"/>
-          <p:nvPr/>
-        </p:nvPicPr>
-        <p:blipFill>
-          <a:blip r:embed="rId3">
-            <a:alphaModFix/>
-          </a:blip>
-          <a:stretch>
-            <a:fillRect/>
-          </a:stretch>
-        </p:blipFill>
-        <p:spPr>
-          <a:xfrm>
-            <a:off x="5439375" y="1485775"/>
-            <a:ext cx="3263850" cy="2171950"/>
-          </a:xfrm>
-          <a:prstGeom prst="rect">
-            <a:avLst/>
-          </a:prstGeom>
-          <a:noFill/>
-          <a:ln>
-            <a:noFill/>
-          </a:ln>
-        </p:spPr>
-      </p:pic>
-    </p:spTree>
-  </p:cSld>
-  <p:clrMapOvr>
-    <a:masterClrMapping/>
-  </p:clrMapOvr>
-</p:sld>
-</file>
-
-<file path=ppt/slides/slide4.xml><?xml version="1.0" encoding="utf-8"?>
-<p:sld xmlns:a="http://schemas.openxmlformats.org/drawingml/2006/main" xmlns:r="http://schemas.openxmlformats.org/officeDocument/2006/relationships" xmlns:p="http://schemas.openxmlformats.org/presentationml/2006/main">
-  <p:cSld>
-    <p:bg>
-      <p:bgPr>
-        <a:gradFill>
-          <a:gsLst>
-            <a:gs pos="0">
-              <a:schemeClr val="accent3"/>
-            </a:gs>
-            <a:gs pos="100000">
-              <a:schemeClr val="dk1"/>
-            </a:gs>
-          </a:gsLst>
-          <a:lin ang="5400012" scaled="0"/>
-        </a:gradFill>
-        <a:effectLst/>
-      </p:bgPr>
-    </p:bg>
-    <p:spTree>
-      <p:nvGrpSpPr>
-        <p:cNvPr id="1" name="Shape 90"/>
-        <p:cNvGrpSpPr/>
-        <p:nvPr/>
-      </p:nvGrpSpPr>
-      <p:grpSpPr>
-        <a:xfrm>
-          <a:off x="0" y="0"/>
-          <a:ext cx="0" cy="0"/>
-          <a:chOff x="0" y="0"/>
-          <a:chExt cx="0" cy="0"/>
-        </a:xfrm>
-      </p:grpSpPr>
-      <p:sp>
-        <p:nvSpPr>
-          <p:cNvPr id="91" name="Google Shape;91;p16"/>
-          <p:cNvSpPr txBox="1">
-            <a:spLocks noGrp="1"/>
-          </p:cNvSpPr>
-          <p:nvPr>
-            <p:ph type="ctrTitle"/>
-          </p:nvPr>
-        </p:nvSpPr>
-        <p:spPr>
-          <a:xfrm>
-            <a:off x="2371725" y="630225"/>
-            <a:ext cx="6331500" cy="905400"/>
-          </a:xfrm>
-          <a:prstGeom prst="rect">
-            <a:avLst/>
-          </a:prstGeom>
-        </p:spPr>
-        <p:txBody>
-          <a:bodyPr spcFirstLastPara="1" wrap="square" lIns="91425" tIns="91425" rIns="91425" bIns="91425" anchor="t" anchorCtr="0">
-            <a:normAutofit fontScale="90000"/>
-          </a:bodyPr>
-          <a:lstStyle/>
-          <a:p>
-            <a:pPr marL="0" lvl="0" indent="0" algn="l" rtl="0">
-              <a:spcBef>
-                <a:spcPts val="0"/>
-              </a:spcBef>
-              <a:spcAft>
-                <a:spcPts val="0"/>
-              </a:spcAft>
-              <a:buClr>
-                <a:schemeClr val="dk2"/>
-              </a:buClr>
-              <a:buSzPts val="990"/>
-              <a:buFont typeface="Arial"/>
-              <a:buNone/>
-            </a:pPr>
-            <a:r>
-              <a:rPr lang="en"/>
-              <a:t>Problem Statement</a:t>
-            </a:r>
-            <a:endParaRPr/>
-          </a:p>
-          <a:p>
-            <a:pPr marL="0" lvl="0" indent="0" algn="l" rtl="0">
-              <a:spcBef>
-                <a:spcPts val="0"/>
-              </a:spcBef>
-              <a:spcAft>
-                <a:spcPts val="0"/>
-              </a:spcAft>
-              <a:buClr>
-                <a:schemeClr val="dk2"/>
-              </a:buClr>
-              <a:buSzPts val="990"/>
-              <a:buFont typeface="Arial"/>
-              <a:buNone/>
-            </a:pPr>
-            <a:endParaRPr/>
-          </a:p>
-          <a:p>
-            <a:pPr marL="0" lvl="0" indent="0" algn="l" rtl="0">
-              <a:spcBef>
-                <a:spcPts val="0"/>
-              </a:spcBef>
-              <a:spcAft>
-                <a:spcPts val="0"/>
-              </a:spcAft>
-              <a:buNone/>
-            </a:pPr>
-            <a:endParaRPr/>
-          </a:p>
-        </p:txBody>
-      </p:sp>
-      <p:sp>
-        <p:nvSpPr>
-          <p:cNvPr id="92" name="Google Shape;92;p16"/>
-          <p:cNvSpPr txBox="1">
-            <a:spLocks noGrp="1"/>
-          </p:cNvSpPr>
-          <p:nvPr>
-            <p:ph type="subTitle" idx="1"/>
-          </p:nvPr>
-        </p:nvSpPr>
-        <p:spPr>
-          <a:xfrm>
-            <a:off x="4152050" y="1629150"/>
-            <a:ext cx="4569600" cy="2647500"/>
-          </a:xfrm>
-          <a:prstGeom prst="rect">
-            <a:avLst/>
-          </a:prstGeom>
-        </p:spPr>
-        <p:txBody>
-          <a:bodyPr spcFirstLastPara="1" wrap="square" lIns="91425" tIns="91425" rIns="91425" bIns="91425" anchor="b" anchorCtr="0">
-            <a:spAutoFit/>
-          </a:bodyPr>
-          <a:lstStyle/>
-          <a:p>
-            <a:pPr marL="0" lvl="0" indent="0" algn="l" rtl="0">
-              <a:spcBef>
-                <a:spcPts val="0"/>
-              </a:spcBef>
-              <a:spcAft>
-                <a:spcPts val="0"/>
-              </a:spcAft>
-              <a:buNone/>
-            </a:pPr>
-            <a:r>
-              <a:rPr lang="en" sz="2000">
-                <a:latin typeface="Oswald"/>
-                <a:ea typeface="Oswald"/>
-                <a:cs typeface="Oswald"/>
-                <a:sym typeface="Oswald"/>
-              </a:rPr>
-              <a:t>“only 20% of public school students have studied foreign languages. By college, this number drops to a staggering 10%.” [2]</a:t>
-            </a:r>
-            <a:endParaRPr sz="2000">
-              <a:latin typeface="Oswald"/>
-              <a:ea typeface="Oswald"/>
-              <a:cs typeface="Oswald"/>
-              <a:sym typeface="Oswald"/>
-            </a:endParaRPr>
-          </a:p>
-          <a:p>
-            <a:pPr marL="0" lvl="0" indent="0" algn="l" rtl="0">
-              <a:spcBef>
-                <a:spcPts val="0"/>
-              </a:spcBef>
-              <a:spcAft>
-                <a:spcPts val="0"/>
-              </a:spcAft>
-              <a:buNone/>
-            </a:pPr>
-            <a:r>
-              <a:rPr lang="en" sz="2000">
-                <a:latin typeface="Oswald"/>
-                <a:ea typeface="Oswald"/>
-                <a:cs typeface="Oswald"/>
-                <a:sym typeface="Oswald"/>
-              </a:rPr>
-              <a:t>School based language learning is not effective for everyone. LingoLizard could be the solution.</a:t>
-            </a:r>
-            <a:endParaRPr sz="2000">
-              <a:latin typeface="Oswald"/>
-              <a:ea typeface="Oswald"/>
-              <a:cs typeface="Oswald"/>
-              <a:sym typeface="Oswald"/>
-            </a:endParaRPr>
-          </a:p>
-          <a:p>
-            <a:pPr marL="0" lvl="0" indent="0" algn="l" rtl="0">
-              <a:spcBef>
-                <a:spcPts val="0"/>
-              </a:spcBef>
-              <a:spcAft>
-                <a:spcPts val="0"/>
-              </a:spcAft>
-              <a:buNone/>
-            </a:pPr>
-            <a:endParaRPr sz="2000">
-              <a:latin typeface="Oswald"/>
-              <a:ea typeface="Oswald"/>
-              <a:cs typeface="Oswald"/>
-              <a:sym typeface="Oswald"/>
-            </a:endParaRPr>
-          </a:p>
-          <a:p>
-            <a:pPr marL="0" lvl="0" indent="0" algn="l" rtl="0">
-              <a:spcBef>
-                <a:spcPts val="0"/>
-              </a:spcBef>
-              <a:spcAft>
-                <a:spcPts val="0"/>
-              </a:spcAft>
-              <a:buNone/>
-            </a:pPr>
-            <a:endParaRPr sz="2000">
-              <a:latin typeface="Oswald"/>
-              <a:ea typeface="Oswald"/>
-              <a:cs typeface="Oswald"/>
-              <a:sym typeface="Oswald"/>
-            </a:endParaRPr>
-          </a:p>
-          <a:p>
-            <a:pPr marL="0" lvl="0" indent="0" algn="l" rtl="0">
-              <a:spcBef>
-                <a:spcPts val="0"/>
-              </a:spcBef>
-              <a:spcAft>
-                <a:spcPts val="0"/>
-              </a:spcAft>
-              <a:buNone/>
-            </a:pPr>
-            <a:endParaRPr sz="2000">
-              <a:latin typeface="Oswald"/>
-              <a:ea typeface="Oswald"/>
-              <a:cs typeface="Oswald"/>
-              <a:sym typeface="Oswald"/>
-            </a:endParaRPr>
-          </a:p>
-        </p:txBody>
-      </p:sp>
-      <p:pic>
-        <p:nvPicPr>
-          <p:cNvPr id="93" name="Google Shape;93;p16"/>
-          <p:cNvPicPr preferRelativeResize="0"/>
-          <p:nvPr/>
-        </p:nvPicPr>
-        <p:blipFill>
-          <a:blip r:embed="rId3">
-            <a:alphaModFix/>
-          </a:blip>
-          <a:stretch>
-            <a:fillRect/>
-          </a:stretch>
-        </p:blipFill>
-        <p:spPr>
-          <a:xfrm>
-            <a:off x="224700" y="1629150"/>
-            <a:ext cx="3845626" cy="2251050"/>
-          </a:xfrm>
-          <a:prstGeom prst="rect">
-            <a:avLst/>
-          </a:prstGeom>
-          <a:noFill/>
-          <a:ln>
-            <a:noFill/>
-          </a:ln>
-        </p:spPr>
-      </p:pic>
-      <p:sp>
-        <p:nvSpPr>
-          <p:cNvPr id="94" name="Google Shape;94;p16"/>
-          <p:cNvSpPr txBox="1"/>
-          <p:nvPr/>
-        </p:nvSpPr>
-        <p:spPr>
-          <a:xfrm>
-            <a:off x="206425" y="3973725"/>
-            <a:ext cx="3963900" cy="481500"/>
-          </a:xfrm>
-          <a:prstGeom prst="rect">
-            <a:avLst/>
-          </a:prstGeom>
-          <a:noFill/>
-          <a:ln>
-            <a:noFill/>
-          </a:ln>
-        </p:spPr>
-        <p:txBody>
-          <a:bodyPr spcFirstLastPara="1" wrap="square" lIns="91425" tIns="91425" rIns="91425" bIns="91425" anchor="t" anchorCtr="0">
-            <a:noAutofit/>
-          </a:bodyPr>
-          <a:lstStyle/>
-          <a:p>
-            <a:pPr marL="0" lvl="0" indent="0" algn="l" rtl="0">
-              <a:spcBef>
-                <a:spcPts val="0"/>
-              </a:spcBef>
-              <a:spcAft>
-                <a:spcPts val="0"/>
-              </a:spcAft>
-              <a:buNone/>
-            </a:pPr>
-            <a:r>
-              <a:rPr lang="en" sz="1200">
-                <a:solidFill>
-                  <a:srgbClr val="FFFFFF"/>
-                </a:solidFill>
-                <a:latin typeface="Lato"/>
-                <a:ea typeface="Lato"/>
-                <a:cs typeface="Lato"/>
-                <a:sym typeface="Lato"/>
-              </a:rPr>
-              <a:t>Fig .2  Graph of non native languages uk adults can speak [1]</a:t>
-            </a:r>
-            <a:endParaRPr sz="1200">
-              <a:solidFill>
-                <a:srgbClr val="FFFFFF"/>
-              </a:solidFill>
-              <a:latin typeface="Lato"/>
-              <a:ea typeface="Lato"/>
-              <a:cs typeface="Lato"/>
-              <a:sym typeface="Lato"/>
-            </a:endParaRPr>
-          </a:p>
-        </p:txBody>
-      </p:sp>
-    </p:spTree>
-  </p:cSld>
-  <p:clrMapOvr>
-    <a:masterClrMapping/>
-  </p:clrMapOvr>
-</p:sld>
-</file>
-
-<file path=ppt/slides/slide5.xml><?xml version="1.0" encoding="utf-8"?>
-<p:sld xmlns:a="http://schemas.openxmlformats.org/drawingml/2006/main" xmlns:r="http://schemas.openxmlformats.org/officeDocument/2006/relationships" xmlns:p="http://schemas.openxmlformats.org/presentationml/2006/main">
-  <p:cSld>
-    <p:bg>
-      <p:bgPr>
-        <a:gradFill>
-          <a:gsLst>
-            <a:gs pos="0">
-              <a:schemeClr val="accent3"/>
-            </a:gs>
-            <a:gs pos="100000">
-              <a:schemeClr val="dk1"/>
-            </a:gs>
-          </a:gsLst>
-          <a:lin ang="5400012" scaled="0"/>
-        </a:gradFill>
-        <a:effectLst/>
-      </p:bgPr>
-    </p:bg>
-    <p:spTree>
-      <p:nvGrpSpPr>
-        <p:cNvPr id="1" name="Shape 98"/>
-        <p:cNvGrpSpPr/>
-        <p:nvPr/>
-      </p:nvGrpSpPr>
-      <p:grpSpPr>
-        <a:xfrm>
-          <a:off x="0" y="0"/>
-          <a:ext cx="0" cy="0"/>
-          <a:chOff x="0" y="0"/>
-          <a:chExt cx="0" cy="0"/>
-        </a:xfrm>
-      </p:grpSpPr>
-      <p:sp>
-        <p:nvSpPr>
-          <p:cNvPr id="99" name="Google Shape;99;p17"/>
-          <p:cNvSpPr txBox="1">
-            <a:spLocks noGrp="1"/>
-          </p:cNvSpPr>
-          <p:nvPr>
-            <p:ph type="ctrTitle"/>
-          </p:nvPr>
-        </p:nvSpPr>
-        <p:spPr>
-          <a:xfrm>
-            <a:off x="2371725" y="630225"/>
-            <a:ext cx="6331500" cy="905400"/>
-          </a:xfrm>
-          <a:prstGeom prst="rect">
-            <a:avLst/>
-          </a:prstGeom>
-        </p:spPr>
-        <p:txBody>
-          <a:bodyPr spcFirstLastPara="1" wrap="square" lIns="91425" tIns="91425" rIns="91425" bIns="91425" anchor="t" anchorCtr="0">
-            <a:normAutofit fontScale="90000"/>
-          </a:bodyPr>
-          <a:lstStyle/>
-          <a:p>
-            <a:pPr marL="0" lvl="0" indent="0" algn="l" rtl="0">
-              <a:spcBef>
-                <a:spcPts val="0"/>
-              </a:spcBef>
-              <a:spcAft>
-                <a:spcPts val="0"/>
-              </a:spcAft>
-              <a:buClr>
-                <a:schemeClr val="dk2"/>
-              </a:buClr>
-              <a:buSzPts val="990"/>
-              <a:buFont typeface="Arial"/>
-              <a:buNone/>
-            </a:pPr>
-            <a:r>
-              <a:rPr lang="en"/>
-              <a:t>Motivation</a:t>
-            </a:r>
-            <a:endParaRPr/>
-          </a:p>
-          <a:p>
-            <a:pPr marL="0" lvl="0" indent="0" algn="l" rtl="0">
-              <a:spcBef>
-                <a:spcPts val="0"/>
-              </a:spcBef>
-              <a:spcAft>
-                <a:spcPts val="0"/>
-              </a:spcAft>
-              <a:buClr>
-                <a:schemeClr val="dk2"/>
-              </a:buClr>
-              <a:buSzPts val="990"/>
-              <a:buFont typeface="Arial"/>
-              <a:buNone/>
-            </a:pPr>
-            <a:endParaRPr/>
-          </a:p>
-          <a:p>
-            <a:pPr marL="0" lvl="0" indent="0" algn="l" rtl="0">
-              <a:spcBef>
-                <a:spcPts val="0"/>
-              </a:spcBef>
-              <a:spcAft>
-                <a:spcPts val="0"/>
-              </a:spcAft>
-              <a:buNone/>
-            </a:pPr>
-            <a:endParaRPr/>
-          </a:p>
-        </p:txBody>
-      </p:sp>
-      <p:sp>
-        <p:nvSpPr>
-          <p:cNvPr id="100" name="Google Shape;100;p17"/>
-          <p:cNvSpPr txBox="1">
-            <a:spLocks noGrp="1"/>
-          </p:cNvSpPr>
-          <p:nvPr>
-            <p:ph type="subTitle" idx="1"/>
-          </p:nvPr>
-        </p:nvSpPr>
-        <p:spPr>
-          <a:xfrm>
-            <a:off x="2390275" y="1629150"/>
-            <a:ext cx="6331500" cy="2955300"/>
-          </a:xfrm>
-          <a:prstGeom prst="rect">
-            <a:avLst/>
-          </a:prstGeom>
-        </p:spPr>
-        <p:txBody>
-          <a:bodyPr spcFirstLastPara="1" wrap="square" lIns="91425" tIns="91425" rIns="91425" bIns="91425" anchor="b" anchorCtr="0">
-            <a:spAutoFit/>
-          </a:bodyPr>
-          <a:lstStyle/>
-          <a:p>
-            <a:pPr marL="457200" lvl="0" indent="-355600" algn="l" rtl="0">
-              <a:spcBef>
-                <a:spcPts val="0"/>
-              </a:spcBef>
-              <a:spcAft>
-                <a:spcPts val="0"/>
-              </a:spcAft>
-              <a:buSzPts val="2000"/>
-              <a:buFont typeface="Oswald"/>
-              <a:buChar char="●"/>
-            </a:pPr>
-            <a:r>
-              <a:rPr lang="en" sz="2000">
-                <a:latin typeface="Oswald"/>
-                <a:ea typeface="Oswald"/>
-                <a:cs typeface="Oswald"/>
-                <a:sym typeface="Oswald"/>
-              </a:rPr>
-              <a:t>The motivation behind Lingolizard is to provide a new approach to practice language that is more engaging and practical.</a:t>
-            </a:r>
-            <a:endParaRPr sz="2000">
-              <a:latin typeface="Oswald"/>
-              <a:ea typeface="Oswald"/>
-              <a:cs typeface="Oswald"/>
-              <a:sym typeface="Oswald"/>
-            </a:endParaRPr>
-          </a:p>
-          <a:p>
-            <a:pPr marL="457200" lvl="0" indent="-355600" algn="l" rtl="0">
-              <a:spcBef>
-                <a:spcPts val="0"/>
-              </a:spcBef>
-              <a:spcAft>
-                <a:spcPts val="0"/>
-              </a:spcAft>
-              <a:buSzPts val="2000"/>
-              <a:buFont typeface="Oswald"/>
-              <a:buChar char="●"/>
-            </a:pPr>
-            <a:r>
-              <a:rPr lang="en" sz="2000">
-                <a:latin typeface="Oswald"/>
-                <a:ea typeface="Oswald"/>
-                <a:cs typeface="Oswald"/>
-                <a:sym typeface="Oswald"/>
-              </a:rPr>
-              <a:t>For many people the school based method of learning languages is either not affordable or not effective for them. </a:t>
-            </a:r>
-            <a:endParaRPr sz="2000">
-              <a:latin typeface="Oswald"/>
-              <a:ea typeface="Oswald"/>
-              <a:cs typeface="Oswald"/>
-              <a:sym typeface="Oswald"/>
-            </a:endParaRPr>
-          </a:p>
-          <a:p>
-            <a:pPr marL="457200" lvl="0" indent="-355600" algn="l" rtl="0">
-              <a:spcBef>
-                <a:spcPts val="0"/>
-              </a:spcBef>
-              <a:spcAft>
-                <a:spcPts val="0"/>
-              </a:spcAft>
-              <a:buSzPts val="2000"/>
-              <a:buFont typeface="Oswald"/>
-              <a:buChar char="●"/>
-            </a:pPr>
-            <a:r>
-              <a:rPr lang="en" sz="2000">
-                <a:latin typeface="Oswald"/>
-                <a:ea typeface="Oswald"/>
-                <a:cs typeface="Oswald"/>
-                <a:sym typeface="Oswald"/>
-              </a:rPr>
-              <a:t>LingoLizard is a tool they can use to get that immersive experience if they do not know a native speaker.</a:t>
-            </a:r>
-            <a:endParaRPr sz="2000">
-              <a:latin typeface="Oswald"/>
-              <a:ea typeface="Oswald"/>
-              <a:cs typeface="Oswald"/>
-              <a:sym typeface="Oswald"/>
-            </a:endParaRPr>
-          </a:p>
-          <a:p>
-            <a:pPr marL="0" lvl="0" indent="0" algn="l" rtl="0">
-              <a:spcBef>
-                <a:spcPts val="0"/>
-              </a:spcBef>
-              <a:spcAft>
-                <a:spcPts val="0"/>
-              </a:spcAft>
-              <a:buNone/>
-            </a:pPr>
-            <a:endParaRPr sz="2000">
-              <a:latin typeface="Oswald"/>
-              <a:ea typeface="Oswald"/>
-              <a:cs typeface="Oswald"/>
-              <a:sym typeface="Oswald"/>
-            </a:endParaRPr>
-          </a:p>
-          <a:p>
-            <a:pPr marL="0" lvl="0" indent="0" algn="l" rtl="0">
-              <a:spcBef>
-                <a:spcPts val="0"/>
-              </a:spcBef>
-              <a:spcAft>
-                <a:spcPts val="0"/>
-              </a:spcAft>
-              <a:buNone/>
-            </a:pPr>
-            <a:endParaRPr sz="2000">
-              <a:latin typeface="Oswald"/>
-              <a:ea typeface="Oswald"/>
-              <a:cs typeface="Oswald"/>
-              <a:sym typeface="Oswald"/>
-            </a:endParaRPr>
-          </a:p>
-        </p:txBody>
-      </p:sp>
-    </p:spTree>
-  </p:cSld>
-  <p:clrMapOvr>
-    <a:masterClrMapping/>
-  </p:clrMapOvr>
-</p:sld>
-</file>
-
-<file path=ppt/slides/slide6.xml><?xml version="1.0" encoding="utf-8"?>
-<p:sld xmlns:a="http://schemas.openxmlformats.org/drawingml/2006/main" xmlns:r="http://schemas.openxmlformats.org/officeDocument/2006/relationships" xmlns:p="http://schemas.openxmlformats.org/presentationml/2006/main">
-  <p:cSld>
-    <p:bg>
-      <p:bgPr>
-        <a:gradFill>
-          <a:gsLst>
-            <a:gs pos="0">
-              <a:schemeClr val="accent3"/>
-            </a:gs>
-            <a:gs pos="100000">
-              <a:schemeClr val="dk1"/>
-            </a:gs>
-          </a:gsLst>
-          <a:lin ang="5400012" scaled="0"/>
-        </a:gradFill>
-        <a:effectLst/>
-      </p:bgPr>
-    </p:bg>
-    <p:spTree>
-      <p:nvGrpSpPr>
-        <p:cNvPr id="1" name="Shape 104"/>
-        <p:cNvGrpSpPr/>
-        <p:nvPr/>
-      </p:nvGrpSpPr>
-      <p:grpSpPr>
-        <a:xfrm>
-          <a:off x="0" y="0"/>
-          <a:ext cx="0" cy="0"/>
-          <a:chOff x="0" y="0"/>
-          <a:chExt cx="0" cy="0"/>
-        </a:xfrm>
-      </p:grpSpPr>
-      <p:sp>
-        <p:nvSpPr>
-          <p:cNvPr id="105" name="Google Shape;105;p18"/>
-          <p:cNvSpPr txBox="1">
-            <a:spLocks noGrp="1"/>
-          </p:cNvSpPr>
-          <p:nvPr>
-            <p:ph type="ctrTitle"/>
-          </p:nvPr>
-        </p:nvSpPr>
-        <p:spPr>
-          <a:xfrm>
-            <a:off x="2371725" y="630225"/>
-            <a:ext cx="6331500" cy="905400"/>
-          </a:xfrm>
-          <a:prstGeom prst="rect">
-            <a:avLst/>
-          </a:prstGeom>
-        </p:spPr>
-        <p:txBody>
-          <a:bodyPr spcFirstLastPara="1" wrap="square" lIns="91425" tIns="91425" rIns="91425" bIns="91425" anchor="t" anchorCtr="0">
-            <a:normAutofit fontScale="90000"/>
-          </a:bodyPr>
-          <a:lstStyle/>
-          <a:p>
-            <a:pPr marL="0" lvl="0" indent="0" algn="l" rtl="0">
-              <a:spcBef>
-                <a:spcPts val="0"/>
-              </a:spcBef>
-              <a:spcAft>
-                <a:spcPts val="0"/>
-              </a:spcAft>
-              <a:buClr>
-                <a:schemeClr val="dk2"/>
-              </a:buClr>
-              <a:buSzPts val="990"/>
-              <a:buFont typeface="Arial"/>
-              <a:buNone/>
-            </a:pPr>
-            <a:r>
-              <a:rPr lang="en"/>
-              <a:t>Technologies</a:t>
-            </a:r>
-            <a:endParaRPr/>
-          </a:p>
-          <a:p>
-            <a:pPr marL="0" lvl="0" indent="0" algn="l" rtl="0">
-              <a:spcBef>
-                <a:spcPts val="0"/>
-              </a:spcBef>
-              <a:spcAft>
-                <a:spcPts val="0"/>
-              </a:spcAft>
-              <a:buClr>
-                <a:schemeClr val="dk2"/>
-              </a:buClr>
-              <a:buSzPts val="990"/>
-              <a:buFont typeface="Arial"/>
-              <a:buNone/>
-            </a:pPr>
-            <a:endParaRPr/>
-          </a:p>
-          <a:p>
-            <a:pPr marL="0" lvl="0" indent="0" algn="l" rtl="0">
-              <a:spcBef>
-                <a:spcPts val="0"/>
-              </a:spcBef>
-              <a:spcAft>
-                <a:spcPts val="0"/>
-              </a:spcAft>
-              <a:buNone/>
-            </a:pPr>
-            <a:endParaRPr/>
-          </a:p>
-        </p:txBody>
-      </p:sp>
-      <p:sp>
-        <p:nvSpPr>
-          <p:cNvPr id="106" name="Google Shape;106;p18"/>
-          <p:cNvSpPr txBox="1">
-            <a:spLocks noGrp="1"/>
-          </p:cNvSpPr>
-          <p:nvPr>
-            <p:ph type="subTitle" idx="1"/>
-          </p:nvPr>
-        </p:nvSpPr>
-        <p:spPr>
-          <a:xfrm>
-            <a:off x="2390275" y="1629150"/>
-            <a:ext cx="6331500" cy="2955300"/>
-          </a:xfrm>
-          <a:prstGeom prst="rect">
-            <a:avLst/>
-          </a:prstGeom>
-        </p:spPr>
-        <p:txBody>
-          <a:bodyPr spcFirstLastPara="1" wrap="square" lIns="91425" tIns="91425" rIns="91425" bIns="91425" anchor="b" anchorCtr="0">
-            <a:spAutoFit/>
-          </a:bodyPr>
-          <a:lstStyle/>
-          <a:p>
-            <a:pPr marL="457200" lvl="0" indent="-355600" algn="l" rtl="0">
-              <a:spcBef>
-                <a:spcPts val="0"/>
-              </a:spcBef>
-              <a:spcAft>
-                <a:spcPts val="0"/>
-              </a:spcAft>
-              <a:buSzPts val="2000"/>
-              <a:buFont typeface="Oswald"/>
-              <a:buChar char="●"/>
-            </a:pPr>
-            <a:r>
-              <a:rPr lang="en" sz="2000" b="1">
-                <a:latin typeface="Oswald"/>
-                <a:ea typeface="Oswald"/>
-                <a:cs typeface="Oswald"/>
-                <a:sym typeface="Oswald"/>
-              </a:rPr>
-              <a:t>Rasa </a:t>
-            </a:r>
-            <a:r>
-              <a:rPr lang="en" sz="2000">
-                <a:latin typeface="Oswald"/>
-                <a:ea typeface="Oswald"/>
-                <a:cs typeface="Oswald"/>
-                <a:sym typeface="Oswald"/>
-              </a:rPr>
-              <a:t>is used to build and manage intelligent conversational systems</a:t>
-            </a:r>
-            <a:endParaRPr sz="2000">
-              <a:latin typeface="Oswald"/>
-              <a:ea typeface="Oswald"/>
-              <a:cs typeface="Oswald"/>
-              <a:sym typeface="Oswald"/>
-            </a:endParaRPr>
-          </a:p>
-          <a:p>
-            <a:pPr marL="457200" lvl="0" indent="-355600" algn="l" rtl="0">
-              <a:spcBef>
-                <a:spcPts val="0"/>
-              </a:spcBef>
-              <a:spcAft>
-                <a:spcPts val="0"/>
-              </a:spcAft>
-              <a:buSzPts val="2000"/>
-              <a:buFont typeface="Oswald"/>
-              <a:buChar char="●"/>
-            </a:pPr>
-            <a:r>
-              <a:rPr lang="en" sz="2000">
-                <a:latin typeface="Oswald"/>
-                <a:ea typeface="Oswald"/>
-                <a:cs typeface="Oswald"/>
-                <a:sym typeface="Oswald"/>
-              </a:rPr>
-              <a:t>It also has built-in Natural Language Understanding (NLU) capabilities that understand user intents and extract information.</a:t>
-            </a:r>
-            <a:endParaRPr sz="2000">
-              <a:latin typeface="Oswald"/>
-              <a:ea typeface="Oswald"/>
-              <a:cs typeface="Oswald"/>
-              <a:sym typeface="Oswald"/>
-            </a:endParaRPr>
-          </a:p>
-          <a:p>
-            <a:pPr marL="457200" lvl="0" indent="-355600" algn="l" rtl="0">
-              <a:spcBef>
-                <a:spcPts val="0"/>
-              </a:spcBef>
-              <a:spcAft>
-                <a:spcPts val="0"/>
-              </a:spcAft>
-              <a:buSzPts val="2000"/>
-              <a:buFont typeface="Oswald"/>
-              <a:buChar char="●"/>
-            </a:pPr>
-            <a:r>
-              <a:rPr lang="en" sz="2000" b="1">
-                <a:latin typeface="Oswald"/>
-                <a:ea typeface="Oswald"/>
-                <a:cs typeface="Oswald"/>
-                <a:sym typeface="Oswald"/>
-              </a:rPr>
-              <a:t>DeepTranslator</a:t>
-            </a:r>
-            <a:r>
-              <a:rPr lang="en" sz="2000">
-                <a:latin typeface="Oswald"/>
-                <a:ea typeface="Oswald"/>
-                <a:cs typeface="Oswald"/>
-                <a:sym typeface="Oswald"/>
-              </a:rPr>
-              <a:t> is a Python library that helps in translating text across multiple languages</a:t>
-            </a:r>
-            <a:endParaRPr sz="2000">
-              <a:latin typeface="Oswald"/>
-              <a:ea typeface="Oswald"/>
-              <a:cs typeface="Oswald"/>
-              <a:sym typeface="Oswald"/>
-            </a:endParaRPr>
-          </a:p>
-          <a:p>
-            <a:pPr marL="457200" lvl="0" indent="-355600" algn="l" rtl="0">
-              <a:spcBef>
-                <a:spcPts val="0"/>
-              </a:spcBef>
-              <a:spcAft>
-                <a:spcPts val="0"/>
-              </a:spcAft>
-              <a:buSzPts val="2000"/>
-              <a:buFont typeface="Oswald"/>
-              <a:buChar char="●"/>
-            </a:pPr>
-            <a:r>
-              <a:rPr lang="en" sz="2000">
-                <a:latin typeface="Oswald"/>
-                <a:ea typeface="Oswald"/>
-                <a:cs typeface="Oswald"/>
-                <a:sym typeface="Oswald"/>
-              </a:rPr>
-              <a:t>It allows the bot to respond in a preferred language, providing a personalised learning experience.</a:t>
-            </a:r>
-            <a:endParaRPr sz="2000">
-              <a:latin typeface="Oswald"/>
-              <a:ea typeface="Oswald"/>
-              <a:cs typeface="Oswald"/>
-              <a:sym typeface="Oswald"/>
-            </a:endParaRPr>
-          </a:p>
-        </p:txBody>
-      </p:sp>
-      <p:pic>
-        <p:nvPicPr>
-          <p:cNvPr id="107" name="Google Shape;107;p18"/>
-          <p:cNvPicPr preferRelativeResize="0"/>
-          <p:nvPr/>
-        </p:nvPicPr>
-        <p:blipFill>
-          <a:blip r:embed="rId3">
-            <a:alphaModFix/>
-          </a:blip>
-          <a:stretch>
-            <a:fillRect/>
-          </a:stretch>
-        </p:blipFill>
-        <p:spPr>
-          <a:xfrm>
-            <a:off x="152400" y="725700"/>
-            <a:ext cx="2038350" cy="1485900"/>
-          </a:xfrm>
-          <a:prstGeom prst="rect">
-            <a:avLst/>
-          </a:prstGeom>
-          <a:noFill/>
-          <a:ln>
-            <a:noFill/>
-          </a:ln>
-        </p:spPr>
-      </p:pic>
-      <p:pic>
-        <p:nvPicPr>
-          <p:cNvPr id="108" name="Google Shape;108;p18"/>
-          <p:cNvPicPr preferRelativeResize="0"/>
-          <p:nvPr/>
-        </p:nvPicPr>
-        <p:blipFill>
-          <a:blip r:embed="rId4">
-            <a:alphaModFix/>
-          </a:blip>
-          <a:stretch>
-            <a:fillRect/>
-          </a:stretch>
-        </p:blipFill>
-        <p:spPr>
-          <a:xfrm>
-            <a:off x="152400" y="2364000"/>
-            <a:ext cx="2038350" cy="2238375"/>
-          </a:xfrm>
-          <a:prstGeom prst="rect">
-            <a:avLst/>
-          </a:prstGeom>
-          <a:noFill/>
-          <a:ln>
-            <a:noFill/>
-          </a:ln>
-        </p:spPr>
-      </p:pic>
-    </p:spTree>
-  </p:cSld>
-  <p:clrMapOvr>
-    <a:masterClrMapping/>
-  </p:clrMapOvr>
-</p:sld>
-</file>
-
-<file path=ppt/slides/slide7.xml><?xml version="1.0" encoding="utf-8"?>
-<p:sld xmlns:a="http://schemas.openxmlformats.org/drawingml/2006/main" xmlns:r="http://schemas.openxmlformats.org/officeDocument/2006/relationships" xmlns:p="http://schemas.openxmlformats.org/presentationml/2006/main">
-  <p:cSld>
-    <p:bg>
-      <p:bgPr>
-        <a:gradFill>
-          <a:gsLst>
-            <a:gs pos="0">
-              <a:schemeClr val="accent3"/>
-            </a:gs>
-            <a:gs pos="100000">
-              <a:schemeClr val="dk1"/>
-            </a:gs>
-          </a:gsLst>
-          <a:lin ang="5400012" scaled="0"/>
-        </a:gradFill>
-        <a:effectLst/>
-      </p:bgPr>
-    </p:bg>
-    <p:spTree>
-      <p:nvGrpSpPr>
-        <p:cNvPr id="1" name="Shape 112"/>
-        <p:cNvGrpSpPr/>
-        <p:nvPr/>
-      </p:nvGrpSpPr>
-      <p:grpSpPr>
-        <a:xfrm>
-          <a:off x="0" y="0"/>
-          <a:ext cx="0" cy="0"/>
-          <a:chOff x="0" y="0"/>
-          <a:chExt cx="0" cy="0"/>
-        </a:xfrm>
-      </p:grpSpPr>
-      <p:sp>
-        <p:nvSpPr>
-          <p:cNvPr id="113" name="Google Shape;113;p19"/>
-          <p:cNvSpPr txBox="1">
-            <a:spLocks noGrp="1"/>
-          </p:cNvSpPr>
-          <p:nvPr>
-            <p:ph type="ctrTitle"/>
-          </p:nvPr>
-        </p:nvSpPr>
-        <p:spPr>
-          <a:xfrm>
-            <a:off x="2371725" y="630225"/>
-            <a:ext cx="6331500" cy="905400"/>
-          </a:xfrm>
-          <a:prstGeom prst="rect">
-            <a:avLst/>
-          </a:prstGeom>
-        </p:spPr>
-        <p:txBody>
-          <a:bodyPr spcFirstLastPara="1" wrap="square" lIns="91425" tIns="91425" rIns="91425" bIns="91425" anchor="t" anchorCtr="0">
-            <a:normAutofit fontScale="90000"/>
-          </a:bodyPr>
-          <a:lstStyle/>
-          <a:p>
-            <a:pPr marL="0" lvl="0" indent="0" algn="l" rtl="0">
-              <a:spcBef>
-                <a:spcPts val="0"/>
-              </a:spcBef>
-              <a:spcAft>
-                <a:spcPts val="0"/>
-              </a:spcAft>
-              <a:buClr>
-                <a:schemeClr val="dk2"/>
-              </a:buClr>
-              <a:buSzPts val="990"/>
-              <a:buFont typeface="Arial"/>
-              <a:buNone/>
-            </a:pPr>
-            <a:r>
-              <a:rPr lang="en"/>
-              <a:t>Features</a:t>
-            </a:r>
-            <a:endParaRPr/>
-          </a:p>
-          <a:p>
-            <a:pPr marL="0" lvl="0" indent="0" algn="l" rtl="0">
-              <a:spcBef>
-                <a:spcPts val="0"/>
-              </a:spcBef>
-              <a:spcAft>
-                <a:spcPts val="0"/>
-              </a:spcAft>
-              <a:buClr>
-                <a:schemeClr val="dk2"/>
-              </a:buClr>
-              <a:buSzPts val="990"/>
-              <a:buFont typeface="Arial"/>
-              <a:buNone/>
-            </a:pPr>
-            <a:endParaRPr/>
-          </a:p>
-          <a:p>
-            <a:pPr marL="0" lvl="0" indent="0" algn="l" rtl="0">
-              <a:spcBef>
-                <a:spcPts val="0"/>
-              </a:spcBef>
-              <a:spcAft>
-                <a:spcPts val="0"/>
-              </a:spcAft>
-              <a:buNone/>
-            </a:pPr>
-            <a:endParaRPr/>
-          </a:p>
-        </p:txBody>
-      </p:sp>
-      <p:sp>
-        <p:nvSpPr>
-          <p:cNvPr id="114" name="Google Shape;114;p19"/>
-          <p:cNvSpPr txBox="1">
-            <a:spLocks noGrp="1"/>
-          </p:cNvSpPr>
-          <p:nvPr>
-            <p:ph type="subTitle" idx="1"/>
-          </p:nvPr>
-        </p:nvSpPr>
-        <p:spPr>
-          <a:xfrm>
-            <a:off x="2371725" y="1436750"/>
-            <a:ext cx="6331500" cy="3879000"/>
-          </a:xfrm>
-          <a:prstGeom prst="rect">
-            <a:avLst/>
-          </a:prstGeom>
-        </p:spPr>
-        <p:txBody>
-          <a:bodyPr spcFirstLastPara="1" wrap="square" lIns="91425" tIns="91425" rIns="91425" bIns="91425" anchor="b" anchorCtr="0">
-            <a:spAutoFit/>
-          </a:bodyPr>
-          <a:lstStyle/>
-          <a:p>
-            <a:pPr marL="457200" lvl="0" indent="-355600" algn="l" rtl="0">
-              <a:spcBef>
-                <a:spcPts val="0"/>
-              </a:spcBef>
-              <a:spcAft>
-                <a:spcPts val="0"/>
-              </a:spcAft>
-              <a:buSzPts val="2000"/>
-              <a:buFont typeface="Oswald"/>
-              <a:buChar char="●"/>
-            </a:pPr>
-            <a:r>
-              <a:rPr lang="en" sz="2000">
-                <a:latin typeface="Oswald"/>
-                <a:ea typeface="Oswald"/>
-                <a:cs typeface="Oswald"/>
-                <a:sym typeface="Oswald"/>
-              </a:rPr>
-              <a:t>Many supported languages for wide audience</a:t>
-            </a:r>
-            <a:endParaRPr sz="2000">
-              <a:latin typeface="Oswald"/>
-              <a:ea typeface="Oswald"/>
-              <a:cs typeface="Oswald"/>
-              <a:sym typeface="Oswald"/>
-            </a:endParaRPr>
-          </a:p>
-          <a:p>
-            <a:pPr marL="914400" lvl="0" indent="0" algn="l" rtl="0">
-              <a:spcBef>
-                <a:spcPts val="0"/>
-              </a:spcBef>
-              <a:spcAft>
-                <a:spcPts val="0"/>
-              </a:spcAft>
-              <a:buNone/>
-            </a:pPr>
-            <a:endParaRPr sz="2000">
-              <a:latin typeface="Oswald"/>
-              <a:ea typeface="Oswald"/>
-              <a:cs typeface="Oswald"/>
-              <a:sym typeface="Oswald"/>
-            </a:endParaRPr>
-          </a:p>
-          <a:p>
-            <a:pPr marL="457200" lvl="0" indent="-355600" algn="l" rtl="0">
-              <a:spcBef>
-                <a:spcPts val="0"/>
-              </a:spcBef>
-              <a:spcAft>
-                <a:spcPts val="0"/>
-              </a:spcAft>
-              <a:buSzPts val="2000"/>
-              <a:buFont typeface="Oswald"/>
-              <a:buChar char="●"/>
-            </a:pPr>
-            <a:r>
-              <a:rPr lang="en" sz="2000">
-                <a:latin typeface="Oswald"/>
-                <a:ea typeface="Oswald"/>
-                <a:cs typeface="Oswald"/>
-                <a:sym typeface="Oswald"/>
-              </a:rPr>
-              <a:t>Gamified features such as streaks, leaderboard and points</a:t>
-            </a:r>
-            <a:br>
-              <a:rPr lang="en" sz="2000">
-                <a:latin typeface="Oswald"/>
-                <a:ea typeface="Oswald"/>
-                <a:cs typeface="Oswald"/>
-                <a:sym typeface="Oswald"/>
-              </a:rPr>
-            </a:br>
-            <a:endParaRPr sz="2000">
-              <a:latin typeface="Oswald"/>
-              <a:ea typeface="Oswald"/>
-              <a:cs typeface="Oswald"/>
-              <a:sym typeface="Oswald"/>
-            </a:endParaRPr>
-          </a:p>
-          <a:p>
-            <a:pPr marL="457200" lvl="0" indent="-355600" algn="l" rtl="0">
-              <a:spcBef>
-                <a:spcPts val="0"/>
-              </a:spcBef>
-              <a:spcAft>
-                <a:spcPts val="0"/>
-              </a:spcAft>
-              <a:buSzPts val="2000"/>
-              <a:buFont typeface="Oswald"/>
-              <a:buChar char="●"/>
-            </a:pPr>
-            <a:r>
-              <a:rPr lang="en" sz="2000">
-                <a:latin typeface="Oswald"/>
-                <a:ea typeface="Oswald"/>
-                <a:cs typeface="Oswald"/>
-                <a:sym typeface="Oswald"/>
-              </a:rPr>
-              <a:t>Provide real time conversation type lessons and corrections</a:t>
-            </a:r>
-            <a:br>
-              <a:rPr lang="en" sz="2000">
-                <a:latin typeface="Oswald"/>
-                <a:ea typeface="Oswald"/>
-                <a:cs typeface="Oswald"/>
-                <a:sym typeface="Oswald"/>
-              </a:rPr>
-            </a:br>
-            <a:endParaRPr sz="2000">
-              <a:latin typeface="Oswald"/>
-              <a:ea typeface="Oswald"/>
-              <a:cs typeface="Oswald"/>
-              <a:sym typeface="Oswald"/>
-            </a:endParaRPr>
-          </a:p>
-          <a:p>
-            <a:pPr marL="457200" lvl="0" indent="-355600" algn="l" rtl="0">
-              <a:spcBef>
-                <a:spcPts val="0"/>
-              </a:spcBef>
-              <a:spcAft>
-                <a:spcPts val="0"/>
-              </a:spcAft>
-              <a:buSzPts val="2000"/>
-              <a:buFont typeface="Oswald"/>
-              <a:buChar char="●"/>
-            </a:pPr>
-            <a:r>
-              <a:rPr lang="en" sz="2000">
-                <a:latin typeface="Oswald"/>
-                <a:ea typeface="Oswald"/>
-                <a:cs typeface="Oswald"/>
-                <a:sym typeface="Oswald"/>
-              </a:rPr>
-              <a:t>Provide reminders and notifications to users</a:t>
-            </a:r>
-            <a:endParaRPr sz="2000">
-              <a:latin typeface="Oswald"/>
-              <a:ea typeface="Oswald"/>
-              <a:cs typeface="Oswald"/>
-              <a:sym typeface="Oswald"/>
-            </a:endParaRPr>
-          </a:p>
-          <a:p>
-            <a:pPr marL="457200" lvl="0" indent="0" algn="l" rtl="0">
-              <a:spcBef>
-                <a:spcPts val="0"/>
-              </a:spcBef>
-              <a:spcAft>
-                <a:spcPts val="0"/>
-              </a:spcAft>
-              <a:buNone/>
-            </a:pPr>
-            <a:endParaRPr sz="2000">
-              <a:latin typeface="Oswald"/>
-              <a:ea typeface="Oswald"/>
-              <a:cs typeface="Oswald"/>
-              <a:sym typeface="Oswald"/>
-            </a:endParaRPr>
-          </a:p>
-          <a:p>
-            <a:pPr marL="457200" lvl="0" indent="-355600" algn="l" rtl="0">
-              <a:spcBef>
-                <a:spcPts val="0"/>
-              </a:spcBef>
-              <a:spcAft>
-                <a:spcPts val="0"/>
-              </a:spcAft>
-              <a:buSzPts val="2000"/>
-              <a:buFont typeface="Oswald"/>
-              <a:buChar char="●"/>
-            </a:pPr>
-            <a:r>
-              <a:rPr lang="en" sz="2000">
-                <a:latin typeface="Oswald"/>
-                <a:ea typeface="Oswald"/>
-                <a:cs typeface="Oswald"/>
-                <a:sym typeface="Oswald"/>
-              </a:rPr>
-              <a:t>LingoLizard will be hosted on the web, making it accessible to users worldwide.</a:t>
-            </a:r>
-            <a:endParaRPr sz="2000">
-              <a:latin typeface="Oswald"/>
-              <a:ea typeface="Oswald"/>
-              <a:cs typeface="Oswald"/>
-              <a:sym typeface="Oswald"/>
-            </a:endParaRPr>
-          </a:p>
-          <a:p>
-            <a:pPr marL="0" lvl="0" indent="0" algn="l" rtl="0">
-              <a:spcBef>
-                <a:spcPts val="0"/>
-              </a:spcBef>
-              <a:spcAft>
-                <a:spcPts val="0"/>
-              </a:spcAft>
-              <a:buNone/>
-            </a:pPr>
-            <a:endParaRPr sz="2000">
-              <a:latin typeface="Oswald"/>
-              <a:ea typeface="Oswald"/>
-              <a:cs typeface="Oswald"/>
-              <a:sym typeface="Oswald"/>
-            </a:endParaRPr>
-          </a:p>
-          <a:p>
-            <a:pPr marL="0" lvl="0" indent="0" algn="l" rtl="0">
-              <a:spcBef>
-                <a:spcPts val="0"/>
-              </a:spcBef>
-              <a:spcAft>
-                <a:spcPts val="0"/>
-              </a:spcAft>
-              <a:buNone/>
-            </a:pPr>
-            <a:endParaRPr sz="2000">
-              <a:latin typeface="Oswald"/>
-              <a:ea typeface="Oswald"/>
-              <a:cs typeface="Oswald"/>
-              <a:sym typeface="Oswald"/>
-            </a:endParaRPr>
-          </a:p>
-        </p:txBody>
-      </p:sp>
-    </p:spTree>
-  </p:cSld>
-  <p:clrMapOvr>
-    <a:masterClrMapping/>
-  </p:clrMapOvr>
-</p:sld>
-</file>
-
-<file path=ppt/slides/slide8.xml><?xml version="1.0" encoding="utf-8"?>
-<p:sld xmlns:a="http://schemas.openxmlformats.org/drawingml/2006/main" xmlns:r="http://schemas.openxmlformats.org/officeDocument/2006/relationships" xmlns:p="http://schemas.openxmlformats.org/presentationml/2006/main">
-  <p:cSld>
-    <p:bg>
-      <p:bgPr>
-        <a:gradFill>
-          <a:gsLst>
-            <a:gs pos="0">
-              <a:schemeClr val="accent3"/>
-            </a:gs>
-            <a:gs pos="100000">
-              <a:schemeClr val="dk1"/>
-            </a:gs>
-          </a:gsLst>
-          <a:lin ang="5400012" scaled="0"/>
-        </a:gradFill>
-        <a:effectLst/>
-      </p:bgPr>
-    </p:bg>
-    <p:spTree>
-      <p:nvGrpSpPr>
-        <p:cNvPr id="1" name="Shape 118"/>
-        <p:cNvGrpSpPr/>
-        <p:nvPr/>
-      </p:nvGrpSpPr>
-      <p:grpSpPr>
-        <a:xfrm>
-          <a:off x="0" y="0"/>
-          <a:ext cx="0" cy="0"/>
-          <a:chOff x="0" y="0"/>
-          <a:chExt cx="0" cy="0"/>
-        </a:xfrm>
-      </p:grpSpPr>
-      <p:sp>
-        <p:nvSpPr>
-          <p:cNvPr id="119" name="Google Shape;119;p20"/>
-          <p:cNvSpPr txBox="1">
-            <a:spLocks noGrp="1"/>
-          </p:cNvSpPr>
-          <p:nvPr>
-            <p:ph type="ctrTitle"/>
-          </p:nvPr>
-        </p:nvSpPr>
-        <p:spPr>
-          <a:xfrm>
-            <a:off x="2371725" y="630225"/>
-            <a:ext cx="6331500" cy="905400"/>
-          </a:xfrm>
-          <a:prstGeom prst="rect">
-            <a:avLst/>
-          </a:prstGeom>
-        </p:spPr>
-        <p:txBody>
-          <a:bodyPr spcFirstLastPara="1" wrap="square" lIns="91425" tIns="91425" rIns="91425" bIns="91425" anchor="t" anchorCtr="0">
-            <a:normAutofit fontScale="90000"/>
-          </a:bodyPr>
-          <a:lstStyle/>
-          <a:p>
-            <a:pPr marL="0" lvl="0" indent="0" algn="l" rtl="0">
-              <a:spcBef>
-                <a:spcPts val="0"/>
-              </a:spcBef>
-              <a:spcAft>
-                <a:spcPts val="0"/>
-              </a:spcAft>
-              <a:buClr>
-                <a:schemeClr val="dk2"/>
-              </a:buClr>
-              <a:buSzPts val="990"/>
-              <a:buFont typeface="Arial"/>
-              <a:buNone/>
-            </a:pPr>
-            <a:r>
-              <a:rPr lang="en"/>
-              <a:t>Related Work Analysis</a:t>
-            </a:r>
-            <a:endParaRPr/>
-          </a:p>
-          <a:p>
-            <a:pPr marL="0" lvl="0" indent="0" algn="l" rtl="0">
-              <a:spcBef>
-                <a:spcPts val="0"/>
-              </a:spcBef>
-              <a:spcAft>
-                <a:spcPts val="0"/>
-              </a:spcAft>
-              <a:buClr>
-                <a:schemeClr val="dk2"/>
-              </a:buClr>
-              <a:buSzPts val="990"/>
-              <a:buFont typeface="Arial"/>
-              <a:buNone/>
-            </a:pPr>
-            <a:endParaRPr/>
-          </a:p>
-          <a:p>
-            <a:pPr marL="0" lvl="0" indent="0" algn="l" rtl="0">
-              <a:spcBef>
-                <a:spcPts val="0"/>
-              </a:spcBef>
-              <a:spcAft>
-                <a:spcPts val="0"/>
-              </a:spcAft>
-              <a:buNone/>
-            </a:pPr>
-            <a:endParaRPr/>
-          </a:p>
-        </p:txBody>
-      </p:sp>
-      <p:sp>
-        <p:nvSpPr>
-          <p:cNvPr id="120" name="Google Shape;120;p20"/>
-          <p:cNvSpPr txBox="1">
-            <a:spLocks noGrp="1"/>
-          </p:cNvSpPr>
-          <p:nvPr>
-            <p:ph type="subTitle" idx="1"/>
-          </p:nvPr>
-        </p:nvSpPr>
-        <p:spPr>
-          <a:xfrm>
-            <a:off x="2789025" y="1629150"/>
-            <a:ext cx="5932800" cy="2955300"/>
-          </a:xfrm>
-          <a:prstGeom prst="rect">
-            <a:avLst/>
-          </a:prstGeom>
-        </p:spPr>
-        <p:txBody>
-          <a:bodyPr spcFirstLastPara="1" wrap="square" lIns="91425" tIns="91425" rIns="91425" bIns="91425" anchor="b" anchorCtr="0">
-            <a:spAutoFit/>
-          </a:bodyPr>
-          <a:lstStyle/>
-          <a:p>
-            <a:pPr marL="0" lvl="0" indent="0" algn="l" rtl="0">
-              <a:spcBef>
-                <a:spcPts val="0"/>
-              </a:spcBef>
-              <a:spcAft>
-                <a:spcPts val="0"/>
-              </a:spcAft>
-              <a:buNone/>
-            </a:pPr>
-            <a:r>
-              <a:rPr lang="en" sz="2000">
-                <a:latin typeface="Oswald"/>
-                <a:ea typeface="Oswald"/>
-                <a:cs typeface="Oswald"/>
-                <a:sym typeface="Oswald"/>
-              </a:rPr>
-              <a:t>Duolingo: offers gamified method to learn languages but is limited to basic phrases and grammar while Lingo lizard will have real time conversations.</a:t>
-            </a:r>
-            <a:endParaRPr sz="2000">
-              <a:latin typeface="Oswald"/>
-              <a:ea typeface="Oswald"/>
-              <a:cs typeface="Oswald"/>
-              <a:sym typeface="Oswald"/>
-            </a:endParaRPr>
-          </a:p>
-          <a:p>
-            <a:pPr marL="0" lvl="0" indent="0" algn="l" rtl="0">
-              <a:spcBef>
-                <a:spcPts val="0"/>
-              </a:spcBef>
-              <a:spcAft>
-                <a:spcPts val="0"/>
-              </a:spcAft>
-              <a:buNone/>
-            </a:pPr>
-            <a:endParaRPr sz="2000">
-              <a:latin typeface="Oswald"/>
-              <a:ea typeface="Oswald"/>
-              <a:cs typeface="Oswald"/>
-              <a:sym typeface="Oswald"/>
-            </a:endParaRPr>
-          </a:p>
-          <a:p>
-            <a:pPr marL="0" lvl="0" indent="0" algn="l" rtl="0">
-              <a:spcBef>
-                <a:spcPts val="0"/>
-              </a:spcBef>
-              <a:spcAft>
-                <a:spcPts val="0"/>
-              </a:spcAft>
-              <a:buNone/>
-            </a:pPr>
-            <a:r>
-              <a:rPr lang="en" sz="2000">
-                <a:latin typeface="Oswald"/>
-                <a:ea typeface="Oswald"/>
-                <a:cs typeface="Oswald"/>
-                <a:sym typeface="Oswald"/>
-              </a:rPr>
-              <a:t>HelloTalk: users practice languages with a native speaker where LingoLizard automates this without depending on others.</a:t>
-            </a:r>
-            <a:endParaRPr sz="2000">
-              <a:latin typeface="Oswald"/>
-              <a:ea typeface="Oswald"/>
-              <a:cs typeface="Oswald"/>
-              <a:sym typeface="Oswald"/>
-            </a:endParaRPr>
-          </a:p>
-          <a:p>
-            <a:pPr marL="0" lvl="0" indent="0" algn="l" rtl="0">
-              <a:spcBef>
-                <a:spcPts val="0"/>
-              </a:spcBef>
-              <a:spcAft>
-                <a:spcPts val="0"/>
-              </a:spcAft>
-              <a:buNone/>
-            </a:pPr>
-            <a:endParaRPr sz="2000">
-              <a:latin typeface="Oswald"/>
-              <a:ea typeface="Oswald"/>
-              <a:cs typeface="Oswald"/>
-              <a:sym typeface="Oswald"/>
-            </a:endParaRPr>
-          </a:p>
-          <a:p>
-            <a:pPr marL="0" lvl="0" indent="0" algn="l" rtl="0">
-              <a:spcBef>
-                <a:spcPts val="0"/>
-              </a:spcBef>
-              <a:spcAft>
-                <a:spcPts val="0"/>
-              </a:spcAft>
-              <a:buNone/>
-            </a:pPr>
-            <a:endParaRPr sz="2000">
-              <a:latin typeface="Oswald"/>
-              <a:ea typeface="Oswald"/>
-              <a:cs typeface="Oswald"/>
-              <a:sym typeface="Oswald"/>
-            </a:endParaRPr>
-          </a:p>
-        </p:txBody>
-      </p:sp>
-      <p:pic>
-        <p:nvPicPr>
-          <p:cNvPr id="121" name="Google Shape;121;p20"/>
-          <p:cNvPicPr preferRelativeResize="0"/>
-          <p:nvPr/>
-        </p:nvPicPr>
-        <p:blipFill>
-          <a:blip r:embed="rId3">
-            <a:alphaModFix/>
-          </a:blip>
-          <a:stretch>
-            <a:fillRect/>
-          </a:stretch>
-        </p:blipFill>
-        <p:spPr>
-          <a:xfrm>
-            <a:off x="250475" y="1615425"/>
-            <a:ext cx="1912640" cy="1912640"/>
-          </a:xfrm>
-          <a:prstGeom prst="rect">
-            <a:avLst/>
-          </a:prstGeom>
-          <a:noFill/>
-          <a:ln>
-            <a:noFill/>
-          </a:ln>
-        </p:spPr>
-      </p:pic>
-    </p:spTree>
-  </p:cSld>
-  <p:clrMapOvr>
-    <a:masterClrMapping/>
-  </p:clrMapOvr>
-</p:sld>
-</file>
-
-<file path=ppt/slides/slide9.xml><?xml version="1.0" encoding="utf-8"?>
-<p:sld xmlns:a="http://schemas.openxmlformats.org/drawingml/2006/main" xmlns:r="http://schemas.openxmlformats.org/officeDocument/2006/relationships" xmlns:p="http://schemas.openxmlformats.org/presentationml/2006/main">
-  <p:cSld>
-    <p:bg>
-      <p:bgPr>
-        <a:gradFill>
-          <a:gsLst>
-            <a:gs pos="0">
-              <a:schemeClr val="accent3"/>
-            </a:gs>
-            <a:gs pos="100000">
-              <a:schemeClr val="dk1"/>
-            </a:gs>
-          </a:gsLst>
-          <a:lin ang="5400012" scaled="0"/>
-        </a:gradFill>
-        <a:effectLst/>
-      </p:bgPr>
-    </p:bg>
-    <p:spTree>
-      <p:nvGrpSpPr>
-        <p:cNvPr id="1" name="Shape 125"/>
-        <p:cNvGrpSpPr/>
-        <p:nvPr/>
-      </p:nvGrpSpPr>
-      <p:grpSpPr>
-        <a:xfrm>
-          <a:off x="0" y="0"/>
-          <a:ext cx="0" cy="0"/>
-          <a:chOff x="0" y="0"/>
-          <a:chExt cx="0" cy="0"/>
-        </a:xfrm>
-      </p:grpSpPr>
-      <p:sp>
-        <p:nvSpPr>
-          <p:cNvPr id="126" name="Google Shape;126;p21"/>
-          <p:cNvSpPr txBox="1">
-            <a:spLocks noGrp="1"/>
-          </p:cNvSpPr>
-          <p:nvPr>
-            <p:ph type="ctrTitle"/>
-          </p:nvPr>
-        </p:nvSpPr>
-        <p:spPr>
-          <a:xfrm>
-            <a:off x="2371725" y="630225"/>
-            <a:ext cx="6331500" cy="905400"/>
-          </a:xfrm>
-          <a:prstGeom prst="rect">
-            <a:avLst/>
-          </a:prstGeom>
-        </p:spPr>
-        <p:txBody>
-          <a:bodyPr spcFirstLastPara="1" wrap="square" lIns="91425" tIns="91425" rIns="91425" bIns="91425" anchor="t" anchorCtr="0">
-            <a:normAutofit fontScale="90000"/>
-          </a:bodyPr>
-          <a:lstStyle/>
-          <a:p>
-            <a:pPr marL="0" lvl="0" indent="0" algn="l" rtl="0">
-              <a:spcBef>
-                <a:spcPts val="0"/>
-              </a:spcBef>
-              <a:spcAft>
-                <a:spcPts val="0"/>
-              </a:spcAft>
-              <a:buClr>
-                <a:schemeClr val="dk2"/>
-              </a:buClr>
-              <a:buSzPts val="990"/>
-              <a:buFont typeface="Arial"/>
-              <a:buNone/>
-            </a:pPr>
-            <a:r>
-              <a:rPr lang="en"/>
-              <a:t>What i have so far?</a:t>
-            </a:r>
-            <a:endParaRPr/>
-          </a:p>
-          <a:p>
-            <a:pPr marL="0" lvl="0" indent="0" algn="l" rtl="0">
-              <a:spcBef>
-                <a:spcPts val="0"/>
-              </a:spcBef>
-              <a:spcAft>
-                <a:spcPts val="0"/>
-              </a:spcAft>
-              <a:buClr>
-                <a:schemeClr val="dk2"/>
-              </a:buClr>
-              <a:buSzPts val="990"/>
-              <a:buFont typeface="Arial"/>
-              <a:buNone/>
-            </a:pPr>
-            <a:endParaRPr/>
-          </a:p>
-          <a:p>
-            <a:pPr marL="0" lvl="0" indent="0" algn="l" rtl="0">
-              <a:spcBef>
-                <a:spcPts val="0"/>
-              </a:spcBef>
-              <a:spcAft>
-                <a:spcPts val="0"/>
-              </a:spcAft>
-              <a:buNone/>
-            </a:pPr>
-            <a:endParaRPr/>
-          </a:p>
-        </p:txBody>
-      </p:sp>
-      <p:sp>
-        <p:nvSpPr>
-          <p:cNvPr id="127" name="Google Shape;127;p21"/>
-          <p:cNvSpPr txBox="1">
-            <a:spLocks noGrp="1"/>
-          </p:cNvSpPr>
-          <p:nvPr>
-            <p:ph type="subTitle" idx="1"/>
-          </p:nvPr>
-        </p:nvSpPr>
-        <p:spPr>
-          <a:xfrm>
-            <a:off x="1814175" y="1535625"/>
-            <a:ext cx="5932800" cy="1723800"/>
-          </a:xfrm>
-          <a:prstGeom prst="rect">
-            <a:avLst/>
-          </a:prstGeom>
-        </p:spPr>
-        <p:txBody>
-          <a:bodyPr spcFirstLastPara="1" wrap="square" lIns="91425" tIns="91425" rIns="91425" bIns="91425" anchor="b" anchorCtr="0">
-            <a:spAutoFit/>
-          </a:bodyPr>
-          <a:lstStyle/>
-          <a:p>
-            <a:pPr marL="457200" lvl="0" indent="-355600" algn="l" rtl="0">
-              <a:spcBef>
-                <a:spcPts val="0"/>
-              </a:spcBef>
-              <a:spcAft>
-                <a:spcPts val="0"/>
-              </a:spcAft>
-              <a:buSzPts val="2000"/>
-              <a:buFont typeface="Oswald"/>
-              <a:buChar char="●"/>
-            </a:pPr>
-            <a:r>
-              <a:rPr lang="en" sz="2000">
-                <a:latin typeface="Oswald"/>
-                <a:ea typeface="Oswald"/>
-                <a:cs typeface="Oswald"/>
-                <a:sym typeface="Oswald"/>
-              </a:rPr>
-              <a:t>Gather understanding of technologies</a:t>
-            </a:r>
-            <a:endParaRPr sz="2000">
-              <a:latin typeface="Oswald"/>
-              <a:ea typeface="Oswald"/>
-              <a:cs typeface="Oswald"/>
-              <a:sym typeface="Oswald"/>
-            </a:endParaRPr>
-          </a:p>
-          <a:p>
-            <a:pPr marL="457200" lvl="0" indent="0" algn="l" rtl="0">
-              <a:spcBef>
-                <a:spcPts val="0"/>
-              </a:spcBef>
-              <a:spcAft>
-                <a:spcPts val="0"/>
-              </a:spcAft>
-              <a:buNone/>
-            </a:pPr>
-            <a:endParaRPr sz="2000">
-              <a:latin typeface="Oswald"/>
-              <a:ea typeface="Oswald"/>
-              <a:cs typeface="Oswald"/>
-              <a:sym typeface="Oswald"/>
-            </a:endParaRPr>
-          </a:p>
-          <a:p>
-            <a:pPr marL="457200" lvl="0" indent="-355600" algn="l" rtl="0">
-              <a:spcBef>
-                <a:spcPts val="0"/>
-              </a:spcBef>
-              <a:spcAft>
-                <a:spcPts val="0"/>
-              </a:spcAft>
-              <a:buSzPts val="2000"/>
-              <a:buFont typeface="Oswald"/>
-              <a:buChar char="●"/>
-            </a:pPr>
-            <a:r>
-              <a:rPr lang="en" sz="2000">
-                <a:latin typeface="Oswald"/>
-                <a:ea typeface="Oswald"/>
-                <a:cs typeface="Oswald"/>
-                <a:sym typeface="Oswald"/>
-              </a:rPr>
-              <a:t>Documentation </a:t>
-            </a:r>
-            <a:endParaRPr sz="2000">
-              <a:latin typeface="Oswald"/>
-              <a:ea typeface="Oswald"/>
-              <a:cs typeface="Oswald"/>
-              <a:sym typeface="Oswald"/>
-            </a:endParaRPr>
-          </a:p>
-          <a:p>
-            <a:pPr marL="457200" lvl="0" indent="0" algn="l" rtl="0">
-              <a:spcBef>
-                <a:spcPts val="0"/>
-              </a:spcBef>
-              <a:spcAft>
-                <a:spcPts val="0"/>
-              </a:spcAft>
-              <a:buNone/>
-            </a:pPr>
-            <a:endParaRPr sz="2000">
-              <a:latin typeface="Oswald"/>
-              <a:ea typeface="Oswald"/>
-              <a:cs typeface="Oswald"/>
-              <a:sym typeface="Oswald"/>
-            </a:endParaRPr>
-          </a:p>
-          <a:p>
-            <a:pPr marL="457200" lvl="0" indent="-355600" algn="l" rtl="0">
-              <a:spcBef>
-                <a:spcPts val="0"/>
-              </a:spcBef>
-              <a:spcAft>
-                <a:spcPts val="0"/>
-              </a:spcAft>
-              <a:buSzPts val="2000"/>
-              <a:buFont typeface="Oswald"/>
-              <a:buChar char="●"/>
-            </a:pPr>
-            <a:r>
-              <a:rPr lang="en" sz="2000">
-                <a:latin typeface="Oswald"/>
-                <a:ea typeface="Oswald"/>
-                <a:cs typeface="Oswald"/>
-                <a:sym typeface="Oswald"/>
-              </a:rPr>
-              <a:t>Developed the greeting </a:t>
-            </a:r>
-            <a:endParaRPr sz="2000">
-              <a:latin typeface="Oswald"/>
-              <a:ea typeface="Oswald"/>
-              <a:cs typeface="Oswald"/>
-              <a:sym typeface="Oswald"/>
-            </a:endParaRPr>
           </a:p>
         </p:txBody>
       </p:sp>

</xml_diff>